<commit_message>
This is a new commit for what I originally planned to be amended
</commit_message>
<xml_diff>
--- a/NewThesis/LaTex-template-package/Drawing4/AST.pptx
+++ b/NewThesis/LaTex-template-package/Drawing4/AST.pptx
@@ -2,12 +2,12 @@
 <file path=ppt/presentation.xml><?xml version="1.0" encoding="utf-8"?>
 <p:presentation xmlns:a="http://schemas.openxmlformats.org/drawingml/2006/main" xmlns:r="http://schemas.openxmlformats.org/officeDocument/2006/relationships" xmlns:p="http://schemas.openxmlformats.org/presentationml/2006/main" saveSubsetFonts="1">
   <p:sldMasterIdLst>
-    <p:sldMasterId id="2147483864" r:id="rId1"/>
+    <p:sldMasterId id="2147483900" r:id="rId1"/>
   </p:sldMasterIdLst>
   <p:sldIdLst>
     <p:sldId id="257" r:id="rId2"/>
   </p:sldIdLst>
-  <p:sldSz cx="20116800" cy="10058400"/>
+  <p:sldSz cx="22860000" cy="10972800"/>
   <p:notesSz cx="6858000" cy="9144000"/>
   <p:defaultTextStyle>
     <a:defPPr>
@@ -106,7 +106,18 @@
   </p:defaultTextStyle>
   <p:extLst>
     <p:ext uri="{EFAFB233-063F-42B5-8137-9DF3F51BA10A}">
-      <p15:sldGuideLst xmlns:p15="http://schemas.microsoft.com/office/powerpoint/2012/main"/>
+      <p15:sldGuideLst xmlns="" xmlns:p15="http://schemas.microsoft.com/office/powerpoint/2012/main">
+        <p15:guide id="1" orient="horz" pos="3456" userDrawn="1">
+          <p15:clr>
+            <a:srgbClr val="A4A3A4"/>
+          </p15:clr>
+        </p15:guide>
+        <p15:guide id="2" pos="7200" userDrawn="1">
+          <p15:clr>
+            <a:srgbClr val="A4A3A4"/>
+          </p15:clr>
+        </p15:guide>
+      </p15:sldGuideLst>
     </p:ext>
   </p:extLst>
 </p:presentation>
@@ -141,20 +152,20 @@
         </p:nvSpPr>
         <p:spPr>
           <a:xfrm>
-            <a:off x="2514600" y="1646133"/>
-            <a:ext cx="15087600" cy="3501813"/>
+            <a:off x="2857500" y="1795781"/>
+            <a:ext cx="17145000" cy="3820160"/>
           </a:xfrm>
         </p:spPr>
         <p:txBody>
           <a:bodyPr anchor="b"/>
           <a:lstStyle>
             <a:lvl1pPr algn="ctr">
-              <a:defRPr sz="8800"/>
+              <a:defRPr sz="9600"/>
             </a:lvl1pPr>
           </a:lstStyle>
           <a:p>
             <a:r>
-              <a:rPr lang="en-US"/>
+              <a:rPr lang="en-US" smtClean="0"/>
               <a:t>Click to edit Master title style</a:t>
             </a:r>
             <a:endParaRPr lang="en-US" dirty="0"/>
@@ -173,8 +184,8 @@
         </p:nvSpPr>
         <p:spPr>
           <a:xfrm>
-            <a:off x="2514600" y="5282989"/>
-            <a:ext cx="15087600" cy="2428451"/>
+            <a:off x="2857500" y="5763261"/>
+            <a:ext cx="17145000" cy="2649219"/>
           </a:xfrm>
         </p:spPr>
         <p:txBody>
@@ -182,44 +193,44 @@
           <a:lstStyle>
             <a:lvl1pPr marL="0" indent="0" algn="ctr">
               <a:buNone/>
-              <a:defRPr sz="3520"/>
+              <a:defRPr sz="3840"/>
             </a:lvl1pPr>
-            <a:lvl2pPr marL="670575" indent="0" algn="ctr">
-              <a:buNone/>
-              <a:defRPr sz="2933"/>
+            <a:lvl2pPr marL="731520" indent="0" algn="ctr">
+              <a:buNone/>
+              <a:defRPr sz="3200"/>
             </a:lvl2pPr>
-            <a:lvl3pPr marL="1341150" indent="0" algn="ctr">
-              <a:buNone/>
-              <a:defRPr sz="2640"/>
+            <a:lvl3pPr marL="1463040" indent="0" algn="ctr">
+              <a:buNone/>
+              <a:defRPr sz="2880"/>
             </a:lvl3pPr>
-            <a:lvl4pPr marL="2011726" indent="0" algn="ctr">
-              <a:buNone/>
-              <a:defRPr sz="2347"/>
+            <a:lvl4pPr marL="2194560" indent="0" algn="ctr">
+              <a:buNone/>
+              <a:defRPr sz="2560"/>
             </a:lvl4pPr>
-            <a:lvl5pPr marL="2682301" indent="0" algn="ctr">
-              <a:buNone/>
-              <a:defRPr sz="2347"/>
+            <a:lvl5pPr marL="2926080" indent="0" algn="ctr">
+              <a:buNone/>
+              <a:defRPr sz="2560"/>
             </a:lvl5pPr>
-            <a:lvl6pPr marL="3352876" indent="0" algn="ctr">
-              <a:buNone/>
-              <a:defRPr sz="2347"/>
+            <a:lvl6pPr marL="3657600" indent="0" algn="ctr">
+              <a:buNone/>
+              <a:defRPr sz="2560"/>
             </a:lvl6pPr>
-            <a:lvl7pPr marL="4023451" indent="0" algn="ctr">
-              <a:buNone/>
-              <a:defRPr sz="2347"/>
+            <a:lvl7pPr marL="4389120" indent="0" algn="ctr">
+              <a:buNone/>
+              <a:defRPr sz="2560"/>
             </a:lvl7pPr>
-            <a:lvl8pPr marL="4694027" indent="0" algn="ctr">
-              <a:buNone/>
-              <a:defRPr sz="2347"/>
+            <a:lvl8pPr marL="5120640" indent="0" algn="ctr">
+              <a:buNone/>
+              <a:defRPr sz="2560"/>
             </a:lvl8pPr>
-            <a:lvl9pPr marL="5364602" indent="0" algn="ctr">
-              <a:buNone/>
-              <a:defRPr sz="2347"/>
+            <a:lvl9pPr marL="5852160" indent="0" algn="ctr">
+              <a:buNone/>
+              <a:defRPr sz="2560"/>
             </a:lvl9pPr>
           </a:lstStyle>
           <a:p>
             <a:r>
-              <a:rPr lang="en-US"/>
+              <a:rPr lang="en-US" smtClean="0"/>
               <a:t>Click to edit Master subtitle style</a:t>
             </a:r>
             <a:endParaRPr lang="en-US" dirty="0"/>
@@ -243,7 +254,7 @@
           <a:p>
             <a:fld id="{18A28253-4B93-4F10-A248-DA5D859E28EF}" type="datetimeFigureOut">
               <a:rPr lang="en-US" smtClean="0"/>
-              <a:t>11/2/2016</a:t>
+              <a:t>11/8/16</a:t>
             </a:fld>
             <a:endParaRPr lang="en-US"/>
           </a:p>
@@ -294,7 +305,7 @@
     </p:spTree>
     <p:extLst>
       <p:ext uri="{BB962C8B-B14F-4D97-AF65-F5344CB8AC3E}">
-        <p14:creationId xmlns:p14="http://schemas.microsoft.com/office/powerpoint/2010/main" val="3958676366"/>
+        <p14:creationId xmlns:p14="http://schemas.microsoft.com/office/powerpoint/2010/main" val="2346655215"/>
       </p:ext>
     </p:extLst>
   </p:cSld>
@@ -337,7 +348,7 @@
           <a:lstStyle/>
           <a:p>
             <a:r>
-              <a:rPr lang="en-US"/>
+              <a:rPr lang="en-US" smtClean="0"/>
               <a:t>Click to edit Master title style</a:t>
             </a:r>
             <a:endParaRPr lang="en-US" dirty="0"/>
@@ -361,35 +372,35 @@
           <a:p>
             <a:pPr lvl="0"/>
             <a:r>
-              <a:rPr lang="en-US"/>
+              <a:rPr lang="en-US" smtClean="0"/>
               <a:t>Click to edit Master text styles</a:t>
             </a:r>
           </a:p>
           <a:p>
             <a:pPr lvl="1"/>
             <a:r>
-              <a:rPr lang="en-US"/>
+              <a:rPr lang="en-US" smtClean="0"/>
               <a:t>Second level</a:t>
             </a:r>
           </a:p>
           <a:p>
             <a:pPr lvl="2"/>
             <a:r>
-              <a:rPr lang="en-US"/>
+              <a:rPr lang="en-US" smtClean="0"/>
               <a:t>Third level</a:t>
             </a:r>
           </a:p>
           <a:p>
             <a:pPr lvl="3"/>
             <a:r>
-              <a:rPr lang="en-US"/>
+              <a:rPr lang="en-US" smtClean="0"/>
               <a:t>Fourth level</a:t>
             </a:r>
           </a:p>
           <a:p>
             <a:pPr lvl="4"/>
             <a:r>
-              <a:rPr lang="en-US"/>
+              <a:rPr lang="en-US" smtClean="0"/>
               <a:t>Fifth level</a:t>
             </a:r>
             <a:endParaRPr lang="en-US" dirty="0"/>
@@ -413,7 +424,7 @@
           <a:p>
             <a:fld id="{18A28253-4B93-4F10-A248-DA5D859E28EF}" type="datetimeFigureOut">
               <a:rPr lang="en-US" smtClean="0"/>
-              <a:t>11/2/2016</a:t>
+              <a:t>11/8/16</a:t>
             </a:fld>
             <a:endParaRPr lang="en-US"/>
           </a:p>
@@ -464,7 +475,7 @@
     </p:spTree>
     <p:extLst>
       <p:ext uri="{BB962C8B-B14F-4D97-AF65-F5344CB8AC3E}">
-        <p14:creationId xmlns:p14="http://schemas.microsoft.com/office/powerpoint/2010/main" val="3538977282"/>
+        <p14:creationId xmlns:p14="http://schemas.microsoft.com/office/powerpoint/2010/main" val="253327518"/>
       </p:ext>
     </p:extLst>
   </p:cSld>
@@ -503,8 +514,8 @@
         </p:nvSpPr>
         <p:spPr>
           <a:xfrm>
-            <a:off x="14396085" y="535517"/>
-            <a:ext cx="4337685" cy="8524029"/>
+            <a:off x="16359187" y="584200"/>
+            <a:ext cx="4929188" cy="9298941"/>
           </a:xfrm>
         </p:spPr>
         <p:txBody>
@@ -512,7 +523,7 @@
           <a:lstStyle/>
           <a:p>
             <a:r>
-              <a:rPr lang="en-US"/>
+              <a:rPr lang="en-US" smtClean="0"/>
               <a:t>Click to edit Master title style</a:t>
             </a:r>
             <a:endParaRPr lang="en-US" dirty="0"/>
@@ -531,8 +542,8 @@
         </p:nvSpPr>
         <p:spPr>
           <a:xfrm>
-            <a:off x="1383030" y="535517"/>
-            <a:ext cx="12761595" cy="8524029"/>
+            <a:off x="1571625" y="584200"/>
+            <a:ext cx="14501813" cy="9298941"/>
           </a:xfrm>
         </p:spPr>
         <p:txBody>
@@ -541,35 +552,35 @@
           <a:p>
             <a:pPr lvl="0"/>
             <a:r>
-              <a:rPr lang="en-US"/>
+              <a:rPr lang="en-US" smtClean="0"/>
               <a:t>Click to edit Master text styles</a:t>
             </a:r>
           </a:p>
           <a:p>
             <a:pPr lvl="1"/>
             <a:r>
-              <a:rPr lang="en-US"/>
+              <a:rPr lang="en-US" smtClean="0"/>
               <a:t>Second level</a:t>
             </a:r>
           </a:p>
           <a:p>
             <a:pPr lvl="2"/>
             <a:r>
-              <a:rPr lang="en-US"/>
+              <a:rPr lang="en-US" smtClean="0"/>
               <a:t>Third level</a:t>
             </a:r>
           </a:p>
           <a:p>
             <a:pPr lvl="3"/>
             <a:r>
-              <a:rPr lang="en-US"/>
+              <a:rPr lang="en-US" smtClean="0"/>
               <a:t>Fourth level</a:t>
             </a:r>
           </a:p>
           <a:p>
             <a:pPr lvl="4"/>
             <a:r>
-              <a:rPr lang="en-US"/>
+              <a:rPr lang="en-US" smtClean="0"/>
               <a:t>Fifth level</a:t>
             </a:r>
             <a:endParaRPr lang="en-US" dirty="0"/>
@@ -593,7 +604,7 @@
           <a:p>
             <a:fld id="{18A28253-4B93-4F10-A248-DA5D859E28EF}" type="datetimeFigureOut">
               <a:rPr lang="en-US" smtClean="0"/>
-              <a:t>11/2/2016</a:t>
+              <a:t>11/8/16</a:t>
             </a:fld>
             <a:endParaRPr lang="en-US"/>
           </a:p>
@@ -644,7 +655,7 @@
     </p:spTree>
     <p:extLst>
       <p:ext uri="{BB962C8B-B14F-4D97-AF65-F5344CB8AC3E}">
-        <p14:creationId xmlns:p14="http://schemas.microsoft.com/office/powerpoint/2010/main" val="2407108456"/>
+        <p14:creationId xmlns:p14="http://schemas.microsoft.com/office/powerpoint/2010/main" val="153988661"/>
       </p:ext>
     </p:extLst>
   </p:cSld>
@@ -687,7 +698,7 @@
           <a:lstStyle/>
           <a:p>
             <a:r>
-              <a:rPr lang="en-US"/>
+              <a:rPr lang="en-US" smtClean="0"/>
               <a:t>Click to edit Master title style</a:t>
             </a:r>
             <a:endParaRPr lang="en-US" dirty="0"/>
@@ -711,35 +722,35 @@
           <a:p>
             <a:pPr lvl="0"/>
             <a:r>
-              <a:rPr lang="en-US"/>
+              <a:rPr lang="en-US" smtClean="0"/>
               <a:t>Click to edit Master text styles</a:t>
             </a:r>
           </a:p>
           <a:p>
             <a:pPr lvl="1"/>
             <a:r>
-              <a:rPr lang="en-US"/>
+              <a:rPr lang="en-US" smtClean="0"/>
               <a:t>Second level</a:t>
             </a:r>
           </a:p>
           <a:p>
             <a:pPr lvl="2"/>
             <a:r>
-              <a:rPr lang="en-US"/>
+              <a:rPr lang="en-US" smtClean="0"/>
               <a:t>Third level</a:t>
             </a:r>
           </a:p>
           <a:p>
             <a:pPr lvl="3"/>
             <a:r>
-              <a:rPr lang="en-US"/>
+              <a:rPr lang="en-US" smtClean="0"/>
               <a:t>Fourth level</a:t>
             </a:r>
           </a:p>
           <a:p>
             <a:pPr lvl="4"/>
             <a:r>
-              <a:rPr lang="en-US"/>
+              <a:rPr lang="en-US" smtClean="0"/>
               <a:t>Fifth level</a:t>
             </a:r>
             <a:endParaRPr lang="en-US" dirty="0"/>
@@ -763,7 +774,7 @@
           <a:p>
             <a:fld id="{18A28253-4B93-4F10-A248-DA5D859E28EF}" type="datetimeFigureOut">
               <a:rPr lang="en-US" smtClean="0"/>
-              <a:t>11/2/2016</a:t>
+              <a:t>11/8/16</a:t>
             </a:fld>
             <a:endParaRPr lang="en-US"/>
           </a:p>
@@ -814,7 +825,7 @@
     </p:spTree>
     <p:extLst>
       <p:ext uri="{BB962C8B-B14F-4D97-AF65-F5344CB8AC3E}">
-        <p14:creationId xmlns:p14="http://schemas.microsoft.com/office/powerpoint/2010/main" val="3587185670"/>
+        <p14:creationId xmlns:p14="http://schemas.microsoft.com/office/powerpoint/2010/main" val="3037949587"/>
       </p:ext>
     </p:extLst>
   </p:cSld>
@@ -853,20 +864,20 @@
         </p:nvSpPr>
         <p:spPr>
           <a:xfrm>
-            <a:off x="1372553" y="2507617"/>
-            <a:ext cx="17350740" cy="4184014"/>
+            <a:off x="1559719" y="2735582"/>
+            <a:ext cx="19716750" cy="4564379"/>
           </a:xfrm>
         </p:spPr>
         <p:txBody>
           <a:bodyPr anchor="b"/>
           <a:lstStyle>
             <a:lvl1pPr>
-              <a:defRPr sz="8800"/>
+              <a:defRPr sz="9600"/>
             </a:lvl1pPr>
           </a:lstStyle>
           <a:p>
             <a:r>
-              <a:rPr lang="en-US"/>
+              <a:rPr lang="en-US" smtClean="0"/>
               <a:t>Click to edit Master title style</a:t>
             </a:r>
             <a:endParaRPr lang="en-US" dirty="0"/>
@@ -885,8 +896,8 @@
         </p:nvSpPr>
         <p:spPr>
           <a:xfrm>
-            <a:off x="1372553" y="6731213"/>
-            <a:ext cx="17350740" cy="2200274"/>
+            <a:off x="1559719" y="7343142"/>
+            <a:ext cx="19716750" cy="2400299"/>
           </a:xfrm>
         </p:spPr>
         <p:txBody>
@@ -894,7 +905,7 @@
           <a:lstStyle>
             <a:lvl1pPr marL="0" indent="0">
               <a:buNone/>
-              <a:defRPr sz="3520">
+              <a:defRPr sz="3840">
                 <a:solidFill>
                   <a:schemeClr val="tx1">
                     <a:tint val="75000"/>
@@ -902,9 +913,9 @@
                 </a:solidFill>
               </a:defRPr>
             </a:lvl1pPr>
-            <a:lvl2pPr marL="670575" indent="0">
-              <a:buNone/>
-              <a:defRPr sz="2933">
+            <a:lvl2pPr marL="731520" indent="0">
+              <a:buNone/>
+              <a:defRPr sz="3200">
                 <a:solidFill>
                   <a:schemeClr val="tx1">
                     <a:tint val="75000"/>
@@ -912,9 +923,9 @@
                 </a:solidFill>
               </a:defRPr>
             </a:lvl2pPr>
-            <a:lvl3pPr marL="1341150" indent="0">
-              <a:buNone/>
-              <a:defRPr sz="2640">
+            <a:lvl3pPr marL="1463040" indent="0">
+              <a:buNone/>
+              <a:defRPr sz="2880">
                 <a:solidFill>
                   <a:schemeClr val="tx1">
                     <a:tint val="75000"/>
@@ -922,9 +933,9 @@
                 </a:solidFill>
               </a:defRPr>
             </a:lvl3pPr>
-            <a:lvl4pPr marL="2011726" indent="0">
-              <a:buNone/>
-              <a:defRPr sz="2347">
+            <a:lvl4pPr marL="2194560" indent="0">
+              <a:buNone/>
+              <a:defRPr sz="2560">
                 <a:solidFill>
                   <a:schemeClr val="tx1">
                     <a:tint val="75000"/>
@@ -932,9 +943,9 @@
                 </a:solidFill>
               </a:defRPr>
             </a:lvl4pPr>
-            <a:lvl5pPr marL="2682301" indent="0">
-              <a:buNone/>
-              <a:defRPr sz="2347">
+            <a:lvl5pPr marL="2926080" indent="0">
+              <a:buNone/>
+              <a:defRPr sz="2560">
                 <a:solidFill>
                   <a:schemeClr val="tx1">
                     <a:tint val="75000"/>
@@ -942,9 +953,9 @@
                 </a:solidFill>
               </a:defRPr>
             </a:lvl5pPr>
-            <a:lvl6pPr marL="3352876" indent="0">
-              <a:buNone/>
-              <a:defRPr sz="2347">
+            <a:lvl6pPr marL="3657600" indent="0">
+              <a:buNone/>
+              <a:defRPr sz="2560">
                 <a:solidFill>
                   <a:schemeClr val="tx1">
                     <a:tint val="75000"/>
@@ -952,9 +963,9 @@
                 </a:solidFill>
               </a:defRPr>
             </a:lvl6pPr>
-            <a:lvl7pPr marL="4023451" indent="0">
-              <a:buNone/>
-              <a:defRPr sz="2347">
+            <a:lvl7pPr marL="4389120" indent="0">
+              <a:buNone/>
+              <a:defRPr sz="2560">
                 <a:solidFill>
                   <a:schemeClr val="tx1">
                     <a:tint val="75000"/>
@@ -962,9 +973,9 @@
                 </a:solidFill>
               </a:defRPr>
             </a:lvl7pPr>
-            <a:lvl8pPr marL="4694027" indent="0">
-              <a:buNone/>
-              <a:defRPr sz="2347">
+            <a:lvl8pPr marL="5120640" indent="0">
+              <a:buNone/>
+              <a:defRPr sz="2560">
                 <a:solidFill>
                   <a:schemeClr val="tx1">
                     <a:tint val="75000"/>
@@ -972,9 +983,9 @@
                 </a:solidFill>
               </a:defRPr>
             </a:lvl8pPr>
-            <a:lvl9pPr marL="5364602" indent="0">
-              <a:buNone/>
-              <a:defRPr sz="2347">
+            <a:lvl9pPr marL="5852160" indent="0">
+              <a:buNone/>
+              <a:defRPr sz="2560">
                 <a:solidFill>
                   <a:schemeClr val="tx1">
                     <a:tint val="75000"/>
@@ -986,7 +997,7 @@
           <a:p>
             <a:pPr lvl="0"/>
             <a:r>
-              <a:rPr lang="en-US"/>
+              <a:rPr lang="en-US" smtClean="0"/>
               <a:t>Click to edit Master text styles</a:t>
             </a:r>
           </a:p>
@@ -1009,7 +1020,7 @@
           <a:p>
             <a:fld id="{18A28253-4B93-4F10-A248-DA5D859E28EF}" type="datetimeFigureOut">
               <a:rPr lang="en-US" smtClean="0"/>
-              <a:t>11/2/2016</a:t>
+              <a:t>11/8/16</a:t>
             </a:fld>
             <a:endParaRPr lang="en-US"/>
           </a:p>
@@ -1060,7 +1071,7 @@
     </p:spTree>
     <p:extLst>
       <p:ext uri="{BB962C8B-B14F-4D97-AF65-F5344CB8AC3E}">
-        <p14:creationId xmlns:p14="http://schemas.microsoft.com/office/powerpoint/2010/main" val="3190908413"/>
+        <p14:creationId xmlns:p14="http://schemas.microsoft.com/office/powerpoint/2010/main" val="1862136400"/>
       </p:ext>
     </p:extLst>
   </p:cSld>
@@ -1103,7 +1114,7 @@
           <a:lstStyle/>
           <a:p>
             <a:r>
-              <a:rPr lang="en-US"/>
+              <a:rPr lang="en-US" smtClean="0"/>
               <a:t>Click to edit Master title style</a:t>
             </a:r>
             <a:endParaRPr lang="en-US" dirty="0"/>
@@ -1122,8 +1133,8 @@
         </p:nvSpPr>
         <p:spPr>
           <a:xfrm>
-            <a:off x="1383030" y="2677584"/>
-            <a:ext cx="8549640" cy="6381962"/>
+            <a:off x="1571625" y="2921000"/>
+            <a:ext cx="9715500" cy="6962141"/>
           </a:xfrm>
         </p:spPr>
         <p:txBody>
@@ -1132,35 +1143,35 @@
           <a:p>
             <a:pPr lvl="0"/>
             <a:r>
-              <a:rPr lang="en-US"/>
+              <a:rPr lang="en-US" smtClean="0"/>
               <a:t>Click to edit Master text styles</a:t>
             </a:r>
           </a:p>
           <a:p>
             <a:pPr lvl="1"/>
             <a:r>
-              <a:rPr lang="en-US"/>
+              <a:rPr lang="en-US" smtClean="0"/>
               <a:t>Second level</a:t>
             </a:r>
           </a:p>
           <a:p>
             <a:pPr lvl="2"/>
             <a:r>
-              <a:rPr lang="en-US"/>
+              <a:rPr lang="en-US" smtClean="0"/>
               <a:t>Third level</a:t>
             </a:r>
           </a:p>
           <a:p>
             <a:pPr lvl="3"/>
             <a:r>
-              <a:rPr lang="en-US"/>
+              <a:rPr lang="en-US" smtClean="0"/>
               <a:t>Fourth level</a:t>
             </a:r>
           </a:p>
           <a:p>
             <a:pPr lvl="4"/>
             <a:r>
-              <a:rPr lang="en-US"/>
+              <a:rPr lang="en-US" smtClean="0"/>
               <a:t>Fifth level</a:t>
             </a:r>
             <a:endParaRPr lang="en-US" dirty="0"/>
@@ -1179,8 +1190,8 @@
         </p:nvSpPr>
         <p:spPr>
           <a:xfrm>
-            <a:off x="10184130" y="2677584"/>
-            <a:ext cx="8549640" cy="6381962"/>
+            <a:off x="11572875" y="2921000"/>
+            <a:ext cx="9715500" cy="6962141"/>
           </a:xfrm>
         </p:spPr>
         <p:txBody>
@@ -1189,35 +1200,35 @@
           <a:p>
             <a:pPr lvl="0"/>
             <a:r>
-              <a:rPr lang="en-US"/>
+              <a:rPr lang="en-US" smtClean="0"/>
               <a:t>Click to edit Master text styles</a:t>
             </a:r>
           </a:p>
           <a:p>
             <a:pPr lvl="1"/>
             <a:r>
-              <a:rPr lang="en-US"/>
+              <a:rPr lang="en-US" smtClean="0"/>
               <a:t>Second level</a:t>
             </a:r>
           </a:p>
           <a:p>
             <a:pPr lvl="2"/>
             <a:r>
-              <a:rPr lang="en-US"/>
+              <a:rPr lang="en-US" smtClean="0"/>
               <a:t>Third level</a:t>
             </a:r>
           </a:p>
           <a:p>
             <a:pPr lvl="3"/>
             <a:r>
-              <a:rPr lang="en-US"/>
+              <a:rPr lang="en-US" smtClean="0"/>
               <a:t>Fourth level</a:t>
             </a:r>
           </a:p>
           <a:p>
             <a:pPr lvl="4"/>
             <a:r>
-              <a:rPr lang="en-US"/>
+              <a:rPr lang="en-US" smtClean="0"/>
               <a:t>Fifth level</a:t>
             </a:r>
             <a:endParaRPr lang="en-US" dirty="0"/>
@@ -1241,7 +1252,7 @@
           <a:p>
             <a:fld id="{18A28253-4B93-4F10-A248-DA5D859E28EF}" type="datetimeFigureOut">
               <a:rPr lang="en-US" smtClean="0"/>
-              <a:t>11/2/2016</a:t>
+              <a:t>11/8/16</a:t>
             </a:fld>
             <a:endParaRPr lang="en-US"/>
           </a:p>
@@ -1292,7 +1303,7 @@
     </p:spTree>
     <p:extLst>
       <p:ext uri="{BB962C8B-B14F-4D97-AF65-F5344CB8AC3E}">
-        <p14:creationId xmlns:p14="http://schemas.microsoft.com/office/powerpoint/2010/main" val="738105742"/>
+        <p14:creationId xmlns:p14="http://schemas.microsoft.com/office/powerpoint/2010/main" val="2640166138"/>
       </p:ext>
     </p:extLst>
   </p:cSld>
@@ -1331,8 +1342,8 @@
         </p:nvSpPr>
         <p:spPr>
           <a:xfrm>
-            <a:off x="1385650" y="535517"/>
-            <a:ext cx="17350740" cy="1944159"/>
+            <a:off x="1574603" y="584201"/>
+            <a:ext cx="19716750" cy="2120901"/>
           </a:xfrm>
         </p:spPr>
         <p:txBody>
@@ -1340,7 +1351,7 @@
           <a:lstStyle/>
           <a:p>
             <a:r>
-              <a:rPr lang="en-US"/>
+              <a:rPr lang="en-US" smtClean="0"/>
               <a:t>Click to edit Master title style</a:t>
             </a:r>
             <a:endParaRPr lang="en-US" dirty="0"/>
@@ -1359,8 +1370,8 @@
         </p:nvSpPr>
         <p:spPr>
           <a:xfrm>
-            <a:off x="1385651" y="2465706"/>
-            <a:ext cx="8510349" cy="1208404"/>
+            <a:off x="1574603" y="2689861"/>
+            <a:ext cx="9670851" cy="1318259"/>
           </a:xfrm>
         </p:spPr>
         <p:txBody>
@@ -1368,45 +1379,45 @@
           <a:lstStyle>
             <a:lvl1pPr marL="0" indent="0">
               <a:buNone/>
-              <a:defRPr sz="3520" b="1"/>
+              <a:defRPr sz="3840" b="1"/>
             </a:lvl1pPr>
-            <a:lvl2pPr marL="670575" indent="0">
-              <a:buNone/>
-              <a:defRPr sz="2933" b="1"/>
+            <a:lvl2pPr marL="731520" indent="0">
+              <a:buNone/>
+              <a:defRPr sz="3200" b="1"/>
             </a:lvl2pPr>
-            <a:lvl3pPr marL="1341150" indent="0">
-              <a:buNone/>
-              <a:defRPr sz="2640" b="1"/>
+            <a:lvl3pPr marL="1463040" indent="0">
+              <a:buNone/>
+              <a:defRPr sz="2880" b="1"/>
             </a:lvl3pPr>
-            <a:lvl4pPr marL="2011726" indent="0">
-              <a:buNone/>
-              <a:defRPr sz="2347" b="1"/>
+            <a:lvl4pPr marL="2194560" indent="0">
+              <a:buNone/>
+              <a:defRPr sz="2560" b="1"/>
             </a:lvl4pPr>
-            <a:lvl5pPr marL="2682301" indent="0">
-              <a:buNone/>
-              <a:defRPr sz="2347" b="1"/>
+            <a:lvl5pPr marL="2926080" indent="0">
+              <a:buNone/>
+              <a:defRPr sz="2560" b="1"/>
             </a:lvl5pPr>
-            <a:lvl6pPr marL="3352876" indent="0">
-              <a:buNone/>
-              <a:defRPr sz="2347" b="1"/>
+            <a:lvl6pPr marL="3657600" indent="0">
+              <a:buNone/>
+              <a:defRPr sz="2560" b="1"/>
             </a:lvl6pPr>
-            <a:lvl7pPr marL="4023451" indent="0">
-              <a:buNone/>
-              <a:defRPr sz="2347" b="1"/>
+            <a:lvl7pPr marL="4389120" indent="0">
+              <a:buNone/>
+              <a:defRPr sz="2560" b="1"/>
             </a:lvl7pPr>
-            <a:lvl8pPr marL="4694027" indent="0">
-              <a:buNone/>
-              <a:defRPr sz="2347" b="1"/>
+            <a:lvl8pPr marL="5120640" indent="0">
+              <a:buNone/>
+              <a:defRPr sz="2560" b="1"/>
             </a:lvl8pPr>
-            <a:lvl9pPr marL="5364602" indent="0">
-              <a:buNone/>
-              <a:defRPr sz="2347" b="1"/>
+            <a:lvl9pPr marL="5852160" indent="0">
+              <a:buNone/>
+              <a:defRPr sz="2560" b="1"/>
             </a:lvl9pPr>
           </a:lstStyle>
           <a:p>
             <a:pPr lvl="0"/>
             <a:r>
-              <a:rPr lang="en-US"/>
+              <a:rPr lang="en-US" smtClean="0"/>
               <a:t>Click to edit Master text styles</a:t>
             </a:r>
           </a:p>
@@ -1424,8 +1435,8 @@
         </p:nvSpPr>
         <p:spPr>
           <a:xfrm>
-            <a:off x="1385651" y="3674110"/>
-            <a:ext cx="8510349" cy="5404062"/>
+            <a:off x="1574603" y="4008120"/>
+            <a:ext cx="9670851" cy="5895341"/>
           </a:xfrm>
         </p:spPr>
         <p:txBody>
@@ -1434,35 +1445,35 @@
           <a:p>
             <a:pPr lvl="0"/>
             <a:r>
-              <a:rPr lang="en-US"/>
+              <a:rPr lang="en-US" smtClean="0"/>
               <a:t>Click to edit Master text styles</a:t>
             </a:r>
           </a:p>
           <a:p>
             <a:pPr lvl="1"/>
             <a:r>
-              <a:rPr lang="en-US"/>
+              <a:rPr lang="en-US" smtClean="0"/>
               <a:t>Second level</a:t>
             </a:r>
           </a:p>
           <a:p>
             <a:pPr lvl="2"/>
             <a:r>
-              <a:rPr lang="en-US"/>
+              <a:rPr lang="en-US" smtClean="0"/>
               <a:t>Third level</a:t>
             </a:r>
           </a:p>
           <a:p>
             <a:pPr lvl="3"/>
             <a:r>
-              <a:rPr lang="en-US"/>
+              <a:rPr lang="en-US" smtClean="0"/>
               <a:t>Fourth level</a:t>
             </a:r>
           </a:p>
           <a:p>
             <a:pPr lvl="4"/>
             <a:r>
-              <a:rPr lang="en-US"/>
+              <a:rPr lang="en-US" smtClean="0"/>
               <a:t>Fifth level</a:t>
             </a:r>
             <a:endParaRPr lang="en-US" dirty="0"/>
@@ -1481,8 +1492,8 @@
         </p:nvSpPr>
         <p:spPr>
           <a:xfrm>
-            <a:off x="10184130" y="2465706"/>
-            <a:ext cx="8552260" cy="1208404"/>
+            <a:off x="11572875" y="2689861"/>
+            <a:ext cx="9718478" cy="1318259"/>
           </a:xfrm>
         </p:spPr>
         <p:txBody>
@@ -1490,45 +1501,45 @@
           <a:lstStyle>
             <a:lvl1pPr marL="0" indent="0">
               <a:buNone/>
-              <a:defRPr sz="3520" b="1"/>
+              <a:defRPr sz="3840" b="1"/>
             </a:lvl1pPr>
-            <a:lvl2pPr marL="670575" indent="0">
-              <a:buNone/>
-              <a:defRPr sz="2933" b="1"/>
+            <a:lvl2pPr marL="731520" indent="0">
+              <a:buNone/>
+              <a:defRPr sz="3200" b="1"/>
             </a:lvl2pPr>
-            <a:lvl3pPr marL="1341150" indent="0">
-              <a:buNone/>
-              <a:defRPr sz="2640" b="1"/>
+            <a:lvl3pPr marL="1463040" indent="0">
+              <a:buNone/>
+              <a:defRPr sz="2880" b="1"/>
             </a:lvl3pPr>
-            <a:lvl4pPr marL="2011726" indent="0">
-              <a:buNone/>
-              <a:defRPr sz="2347" b="1"/>
+            <a:lvl4pPr marL="2194560" indent="0">
+              <a:buNone/>
+              <a:defRPr sz="2560" b="1"/>
             </a:lvl4pPr>
-            <a:lvl5pPr marL="2682301" indent="0">
-              <a:buNone/>
-              <a:defRPr sz="2347" b="1"/>
+            <a:lvl5pPr marL="2926080" indent="0">
+              <a:buNone/>
+              <a:defRPr sz="2560" b="1"/>
             </a:lvl5pPr>
-            <a:lvl6pPr marL="3352876" indent="0">
-              <a:buNone/>
-              <a:defRPr sz="2347" b="1"/>
+            <a:lvl6pPr marL="3657600" indent="0">
+              <a:buNone/>
+              <a:defRPr sz="2560" b="1"/>
             </a:lvl6pPr>
-            <a:lvl7pPr marL="4023451" indent="0">
-              <a:buNone/>
-              <a:defRPr sz="2347" b="1"/>
+            <a:lvl7pPr marL="4389120" indent="0">
+              <a:buNone/>
+              <a:defRPr sz="2560" b="1"/>
             </a:lvl7pPr>
-            <a:lvl8pPr marL="4694027" indent="0">
-              <a:buNone/>
-              <a:defRPr sz="2347" b="1"/>
+            <a:lvl8pPr marL="5120640" indent="0">
+              <a:buNone/>
+              <a:defRPr sz="2560" b="1"/>
             </a:lvl8pPr>
-            <a:lvl9pPr marL="5364602" indent="0">
-              <a:buNone/>
-              <a:defRPr sz="2347" b="1"/>
+            <a:lvl9pPr marL="5852160" indent="0">
+              <a:buNone/>
+              <a:defRPr sz="2560" b="1"/>
             </a:lvl9pPr>
           </a:lstStyle>
           <a:p>
             <a:pPr lvl="0"/>
             <a:r>
-              <a:rPr lang="en-US"/>
+              <a:rPr lang="en-US" smtClean="0"/>
               <a:t>Click to edit Master text styles</a:t>
             </a:r>
           </a:p>
@@ -1546,8 +1557,8 @@
         </p:nvSpPr>
         <p:spPr>
           <a:xfrm>
-            <a:off x="10184130" y="3674110"/>
-            <a:ext cx="8552260" cy="5404062"/>
+            <a:off x="11572875" y="4008120"/>
+            <a:ext cx="9718478" cy="5895341"/>
           </a:xfrm>
         </p:spPr>
         <p:txBody>
@@ -1556,35 +1567,35 @@
           <a:p>
             <a:pPr lvl="0"/>
             <a:r>
-              <a:rPr lang="en-US"/>
+              <a:rPr lang="en-US" smtClean="0"/>
               <a:t>Click to edit Master text styles</a:t>
             </a:r>
           </a:p>
           <a:p>
             <a:pPr lvl="1"/>
             <a:r>
-              <a:rPr lang="en-US"/>
+              <a:rPr lang="en-US" smtClean="0"/>
               <a:t>Second level</a:t>
             </a:r>
           </a:p>
           <a:p>
             <a:pPr lvl="2"/>
             <a:r>
-              <a:rPr lang="en-US"/>
+              <a:rPr lang="en-US" smtClean="0"/>
               <a:t>Third level</a:t>
             </a:r>
           </a:p>
           <a:p>
             <a:pPr lvl="3"/>
             <a:r>
-              <a:rPr lang="en-US"/>
+              <a:rPr lang="en-US" smtClean="0"/>
               <a:t>Fourth level</a:t>
             </a:r>
           </a:p>
           <a:p>
             <a:pPr lvl="4"/>
             <a:r>
-              <a:rPr lang="en-US"/>
+              <a:rPr lang="en-US" smtClean="0"/>
               <a:t>Fifth level</a:t>
             </a:r>
             <a:endParaRPr lang="en-US" dirty="0"/>
@@ -1608,7 +1619,7 @@
           <a:p>
             <a:fld id="{18A28253-4B93-4F10-A248-DA5D859E28EF}" type="datetimeFigureOut">
               <a:rPr lang="en-US" smtClean="0"/>
-              <a:t>11/2/2016</a:t>
+              <a:t>11/8/16</a:t>
             </a:fld>
             <a:endParaRPr lang="en-US"/>
           </a:p>
@@ -1659,7 +1670,7 @@
     </p:spTree>
     <p:extLst>
       <p:ext uri="{BB962C8B-B14F-4D97-AF65-F5344CB8AC3E}">
-        <p14:creationId xmlns:p14="http://schemas.microsoft.com/office/powerpoint/2010/main" val="1551517189"/>
+        <p14:creationId xmlns:p14="http://schemas.microsoft.com/office/powerpoint/2010/main" val="3604973190"/>
       </p:ext>
     </p:extLst>
   </p:cSld>
@@ -1702,7 +1713,7 @@
           <a:lstStyle/>
           <a:p>
             <a:r>
-              <a:rPr lang="en-US"/>
+              <a:rPr lang="en-US" smtClean="0"/>
               <a:t>Click to edit Master title style</a:t>
             </a:r>
             <a:endParaRPr lang="en-US" dirty="0"/>
@@ -1726,7 +1737,7 @@
           <a:p>
             <a:fld id="{18A28253-4B93-4F10-A248-DA5D859E28EF}" type="datetimeFigureOut">
               <a:rPr lang="en-US" smtClean="0"/>
-              <a:t>11/2/2016</a:t>
+              <a:t>11/8/16</a:t>
             </a:fld>
             <a:endParaRPr lang="en-US"/>
           </a:p>
@@ -1777,7 +1788,7 @@
     </p:spTree>
     <p:extLst>
       <p:ext uri="{BB962C8B-B14F-4D97-AF65-F5344CB8AC3E}">
-        <p14:creationId xmlns:p14="http://schemas.microsoft.com/office/powerpoint/2010/main" val="1193942949"/>
+        <p14:creationId xmlns:p14="http://schemas.microsoft.com/office/powerpoint/2010/main" val="4117323681"/>
       </p:ext>
     </p:extLst>
   </p:cSld>
@@ -1821,7 +1832,7 @@
           <a:p>
             <a:fld id="{18A28253-4B93-4F10-A248-DA5D859E28EF}" type="datetimeFigureOut">
               <a:rPr lang="en-US" smtClean="0"/>
-              <a:t>11/2/2016</a:t>
+              <a:t>11/8/16</a:t>
             </a:fld>
             <a:endParaRPr lang="en-US"/>
           </a:p>
@@ -1872,7 +1883,7 @@
     </p:spTree>
     <p:extLst>
       <p:ext uri="{BB962C8B-B14F-4D97-AF65-F5344CB8AC3E}">
-        <p14:creationId xmlns:p14="http://schemas.microsoft.com/office/powerpoint/2010/main" val="4007043128"/>
+        <p14:creationId xmlns:p14="http://schemas.microsoft.com/office/powerpoint/2010/main" val="690947992"/>
       </p:ext>
     </p:extLst>
   </p:cSld>
@@ -1911,20 +1922,20 @@
         </p:nvSpPr>
         <p:spPr>
           <a:xfrm>
-            <a:off x="1385651" y="670560"/>
-            <a:ext cx="6488191" cy="2346960"/>
+            <a:off x="1574604" y="731520"/>
+            <a:ext cx="7372944" cy="2560320"/>
           </a:xfrm>
         </p:spPr>
         <p:txBody>
           <a:bodyPr anchor="b"/>
           <a:lstStyle>
             <a:lvl1pPr>
-              <a:defRPr sz="4693"/>
+              <a:defRPr sz="5120"/>
             </a:lvl1pPr>
           </a:lstStyle>
           <a:p>
             <a:r>
-              <a:rPr lang="en-US"/>
+              <a:rPr lang="en-US" smtClean="0"/>
               <a:t>Click to edit Master title style</a:t>
             </a:r>
             <a:endParaRPr lang="en-US" dirty="0"/>
@@ -1943,73 +1954,73 @@
         </p:nvSpPr>
         <p:spPr>
           <a:xfrm>
-            <a:off x="8552260" y="1448224"/>
-            <a:ext cx="10184130" cy="7147983"/>
+            <a:off x="9718477" y="1579881"/>
+            <a:ext cx="11572875" cy="7797800"/>
           </a:xfrm>
         </p:spPr>
         <p:txBody>
           <a:bodyPr/>
           <a:lstStyle>
             <a:lvl1pPr>
-              <a:defRPr sz="4693"/>
+              <a:defRPr sz="5120"/>
             </a:lvl1pPr>
             <a:lvl2pPr>
-              <a:defRPr sz="4107"/>
+              <a:defRPr sz="4480"/>
             </a:lvl2pPr>
             <a:lvl3pPr>
-              <a:defRPr sz="3520"/>
+              <a:defRPr sz="3840"/>
             </a:lvl3pPr>
             <a:lvl4pPr>
-              <a:defRPr sz="2933"/>
+              <a:defRPr sz="3200"/>
             </a:lvl4pPr>
             <a:lvl5pPr>
-              <a:defRPr sz="2933"/>
+              <a:defRPr sz="3200"/>
             </a:lvl5pPr>
             <a:lvl6pPr>
-              <a:defRPr sz="2933"/>
+              <a:defRPr sz="3200"/>
             </a:lvl6pPr>
             <a:lvl7pPr>
-              <a:defRPr sz="2933"/>
+              <a:defRPr sz="3200"/>
             </a:lvl7pPr>
             <a:lvl8pPr>
-              <a:defRPr sz="2933"/>
+              <a:defRPr sz="3200"/>
             </a:lvl8pPr>
             <a:lvl9pPr>
-              <a:defRPr sz="2933"/>
+              <a:defRPr sz="3200"/>
             </a:lvl9pPr>
           </a:lstStyle>
           <a:p>
             <a:pPr lvl="0"/>
             <a:r>
-              <a:rPr lang="en-US"/>
+              <a:rPr lang="en-US" smtClean="0"/>
               <a:t>Click to edit Master text styles</a:t>
             </a:r>
           </a:p>
           <a:p>
             <a:pPr lvl="1"/>
             <a:r>
-              <a:rPr lang="en-US"/>
+              <a:rPr lang="en-US" smtClean="0"/>
               <a:t>Second level</a:t>
             </a:r>
           </a:p>
           <a:p>
             <a:pPr lvl="2"/>
             <a:r>
-              <a:rPr lang="en-US"/>
+              <a:rPr lang="en-US" smtClean="0"/>
               <a:t>Third level</a:t>
             </a:r>
           </a:p>
           <a:p>
             <a:pPr lvl="3"/>
             <a:r>
-              <a:rPr lang="en-US"/>
+              <a:rPr lang="en-US" smtClean="0"/>
               <a:t>Fourth level</a:t>
             </a:r>
           </a:p>
           <a:p>
             <a:pPr lvl="4"/>
             <a:r>
-              <a:rPr lang="en-US"/>
+              <a:rPr lang="en-US" smtClean="0"/>
               <a:t>Fifth level</a:t>
             </a:r>
             <a:endParaRPr lang="en-US" dirty="0"/>
@@ -2028,8 +2039,8 @@
         </p:nvSpPr>
         <p:spPr>
           <a:xfrm>
-            <a:off x="1385651" y="3017520"/>
-            <a:ext cx="6488191" cy="5590329"/>
+            <a:off x="1574604" y="3291840"/>
+            <a:ext cx="7372944" cy="6098541"/>
           </a:xfrm>
         </p:spPr>
         <p:txBody>
@@ -2037,45 +2048,45 @@
           <a:lstStyle>
             <a:lvl1pPr marL="0" indent="0">
               <a:buNone/>
-              <a:defRPr sz="2347"/>
+              <a:defRPr sz="2560"/>
             </a:lvl1pPr>
-            <a:lvl2pPr marL="670575" indent="0">
-              <a:buNone/>
-              <a:defRPr sz="2053"/>
+            <a:lvl2pPr marL="731520" indent="0">
+              <a:buNone/>
+              <a:defRPr sz="2240"/>
             </a:lvl2pPr>
-            <a:lvl3pPr marL="1341150" indent="0">
-              <a:buNone/>
-              <a:defRPr sz="1760"/>
+            <a:lvl3pPr marL="1463040" indent="0">
+              <a:buNone/>
+              <a:defRPr sz="1920"/>
             </a:lvl3pPr>
-            <a:lvl4pPr marL="2011726" indent="0">
-              <a:buNone/>
-              <a:defRPr sz="1467"/>
+            <a:lvl4pPr marL="2194560" indent="0">
+              <a:buNone/>
+              <a:defRPr sz="1600"/>
             </a:lvl4pPr>
-            <a:lvl5pPr marL="2682301" indent="0">
-              <a:buNone/>
-              <a:defRPr sz="1467"/>
+            <a:lvl5pPr marL="2926080" indent="0">
+              <a:buNone/>
+              <a:defRPr sz="1600"/>
             </a:lvl5pPr>
-            <a:lvl6pPr marL="3352876" indent="0">
-              <a:buNone/>
-              <a:defRPr sz="1467"/>
+            <a:lvl6pPr marL="3657600" indent="0">
+              <a:buNone/>
+              <a:defRPr sz="1600"/>
             </a:lvl6pPr>
-            <a:lvl7pPr marL="4023451" indent="0">
-              <a:buNone/>
-              <a:defRPr sz="1467"/>
+            <a:lvl7pPr marL="4389120" indent="0">
+              <a:buNone/>
+              <a:defRPr sz="1600"/>
             </a:lvl7pPr>
-            <a:lvl8pPr marL="4694027" indent="0">
-              <a:buNone/>
-              <a:defRPr sz="1467"/>
+            <a:lvl8pPr marL="5120640" indent="0">
+              <a:buNone/>
+              <a:defRPr sz="1600"/>
             </a:lvl8pPr>
-            <a:lvl9pPr marL="5364602" indent="0">
-              <a:buNone/>
-              <a:defRPr sz="1467"/>
+            <a:lvl9pPr marL="5852160" indent="0">
+              <a:buNone/>
+              <a:defRPr sz="1600"/>
             </a:lvl9pPr>
           </a:lstStyle>
           <a:p>
             <a:pPr lvl="0"/>
             <a:r>
-              <a:rPr lang="en-US"/>
+              <a:rPr lang="en-US" smtClean="0"/>
               <a:t>Click to edit Master text styles</a:t>
             </a:r>
           </a:p>
@@ -2098,7 +2109,7 @@
           <a:p>
             <a:fld id="{18A28253-4B93-4F10-A248-DA5D859E28EF}" type="datetimeFigureOut">
               <a:rPr lang="en-US" smtClean="0"/>
-              <a:t>11/2/2016</a:t>
+              <a:t>11/8/16</a:t>
             </a:fld>
             <a:endParaRPr lang="en-US"/>
           </a:p>
@@ -2149,7 +2160,7 @@
     </p:spTree>
     <p:extLst>
       <p:ext uri="{BB962C8B-B14F-4D97-AF65-F5344CB8AC3E}">
-        <p14:creationId xmlns:p14="http://schemas.microsoft.com/office/powerpoint/2010/main" val="197155288"/>
+        <p14:creationId xmlns:p14="http://schemas.microsoft.com/office/powerpoint/2010/main" val="3374581492"/>
       </p:ext>
     </p:extLst>
   </p:cSld>
@@ -2188,20 +2199,20 @@
         </p:nvSpPr>
         <p:spPr>
           <a:xfrm>
-            <a:off x="1385651" y="670560"/>
-            <a:ext cx="6488191" cy="2346960"/>
+            <a:off x="1574604" y="731520"/>
+            <a:ext cx="7372944" cy="2560320"/>
           </a:xfrm>
         </p:spPr>
         <p:txBody>
           <a:bodyPr anchor="b"/>
           <a:lstStyle>
             <a:lvl1pPr>
-              <a:defRPr sz="4693"/>
+              <a:defRPr sz="5120"/>
             </a:lvl1pPr>
           </a:lstStyle>
           <a:p>
             <a:r>
-              <a:rPr lang="en-US"/>
+              <a:rPr lang="en-US" smtClean="0"/>
               <a:t>Click to edit Master title style</a:t>
             </a:r>
             <a:endParaRPr lang="en-US" dirty="0"/>
@@ -2220,8 +2231,8 @@
         </p:nvSpPr>
         <p:spPr>
           <a:xfrm>
-            <a:off x="8552260" y="1448224"/>
-            <a:ext cx="10184130" cy="7147983"/>
+            <a:off x="9718477" y="1579881"/>
+            <a:ext cx="11572875" cy="7797800"/>
           </a:xfrm>
         </p:spPr>
         <p:txBody>
@@ -2229,44 +2240,44 @@
           <a:lstStyle>
             <a:lvl1pPr marL="0" indent="0">
               <a:buNone/>
-              <a:defRPr sz="4693"/>
+              <a:defRPr sz="5120"/>
             </a:lvl1pPr>
-            <a:lvl2pPr marL="670575" indent="0">
-              <a:buNone/>
-              <a:defRPr sz="4107"/>
+            <a:lvl2pPr marL="731520" indent="0">
+              <a:buNone/>
+              <a:defRPr sz="4480"/>
             </a:lvl2pPr>
-            <a:lvl3pPr marL="1341150" indent="0">
-              <a:buNone/>
-              <a:defRPr sz="3520"/>
+            <a:lvl3pPr marL="1463040" indent="0">
+              <a:buNone/>
+              <a:defRPr sz="3840"/>
             </a:lvl3pPr>
-            <a:lvl4pPr marL="2011726" indent="0">
-              <a:buNone/>
-              <a:defRPr sz="2933"/>
+            <a:lvl4pPr marL="2194560" indent="0">
+              <a:buNone/>
+              <a:defRPr sz="3200"/>
             </a:lvl4pPr>
-            <a:lvl5pPr marL="2682301" indent="0">
-              <a:buNone/>
-              <a:defRPr sz="2933"/>
+            <a:lvl5pPr marL="2926080" indent="0">
+              <a:buNone/>
+              <a:defRPr sz="3200"/>
             </a:lvl5pPr>
-            <a:lvl6pPr marL="3352876" indent="0">
-              <a:buNone/>
-              <a:defRPr sz="2933"/>
+            <a:lvl6pPr marL="3657600" indent="0">
+              <a:buNone/>
+              <a:defRPr sz="3200"/>
             </a:lvl6pPr>
-            <a:lvl7pPr marL="4023451" indent="0">
-              <a:buNone/>
-              <a:defRPr sz="2933"/>
+            <a:lvl7pPr marL="4389120" indent="0">
+              <a:buNone/>
+              <a:defRPr sz="3200"/>
             </a:lvl7pPr>
-            <a:lvl8pPr marL="4694027" indent="0">
-              <a:buNone/>
-              <a:defRPr sz="2933"/>
+            <a:lvl8pPr marL="5120640" indent="0">
+              <a:buNone/>
+              <a:defRPr sz="3200"/>
             </a:lvl8pPr>
-            <a:lvl9pPr marL="5364602" indent="0">
-              <a:buNone/>
-              <a:defRPr sz="2933"/>
+            <a:lvl9pPr marL="5852160" indent="0">
+              <a:buNone/>
+              <a:defRPr sz="3200"/>
             </a:lvl9pPr>
           </a:lstStyle>
           <a:p>
             <a:r>
-              <a:rPr lang="en-US"/>
+              <a:rPr lang="en-US" smtClean="0"/>
               <a:t>Click icon to add picture</a:t>
             </a:r>
             <a:endParaRPr lang="en-US" dirty="0"/>
@@ -2285,8 +2296,8 @@
         </p:nvSpPr>
         <p:spPr>
           <a:xfrm>
-            <a:off x="1385651" y="3017520"/>
-            <a:ext cx="6488191" cy="5590329"/>
+            <a:off x="1574604" y="3291840"/>
+            <a:ext cx="7372944" cy="6098541"/>
           </a:xfrm>
         </p:spPr>
         <p:txBody>
@@ -2294,45 +2305,45 @@
           <a:lstStyle>
             <a:lvl1pPr marL="0" indent="0">
               <a:buNone/>
-              <a:defRPr sz="2347"/>
+              <a:defRPr sz="2560"/>
             </a:lvl1pPr>
-            <a:lvl2pPr marL="670575" indent="0">
-              <a:buNone/>
-              <a:defRPr sz="2053"/>
+            <a:lvl2pPr marL="731520" indent="0">
+              <a:buNone/>
+              <a:defRPr sz="2240"/>
             </a:lvl2pPr>
-            <a:lvl3pPr marL="1341150" indent="0">
-              <a:buNone/>
-              <a:defRPr sz="1760"/>
+            <a:lvl3pPr marL="1463040" indent="0">
+              <a:buNone/>
+              <a:defRPr sz="1920"/>
             </a:lvl3pPr>
-            <a:lvl4pPr marL="2011726" indent="0">
-              <a:buNone/>
-              <a:defRPr sz="1467"/>
+            <a:lvl4pPr marL="2194560" indent="0">
+              <a:buNone/>
+              <a:defRPr sz="1600"/>
             </a:lvl4pPr>
-            <a:lvl5pPr marL="2682301" indent="0">
-              <a:buNone/>
-              <a:defRPr sz="1467"/>
+            <a:lvl5pPr marL="2926080" indent="0">
+              <a:buNone/>
+              <a:defRPr sz="1600"/>
             </a:lvl5pPr>
-            <a:lvl6pPr marL="3352876" indent="0">
-              <a:buNone/>
-              <a:defRPr sz="1467"/>
+            <a:lvl6pPr marL="3657600" indent="0">
+              <a:buNone/>
+              <a:defRPr sz="1600"/>
             </a:lvl6pPr>
-            <a:lvl7pPr marL="4023451" indent="0">
-              <a:buNone/>
-              <a:defRPr sz="1467"/>
+            <a:lvl7pPr marL="4389120" indent="0">
+              <a:buNone/>
+              <a:defRPr sz="1600"/>
             </a:lvl7pPr>
-            <a:lvl8pPr marL="4694027" indent="0">
-              <a:buNone/>
-              <a:defRPr sz="1467"/>
+            <a:lvl8pPr marL="5120640" indent="0">
+              <a:buNone/>
+              <a:defRPr sz="1600"/>
             </a:lvl8pPr>
-            <a:lvl9pPr marL="5364602" indent="0">
-              <a:buNone/>
-              <a:defRPr sz="1467"/>
+            <a:lvl9pPr marL="5852160" indent="0">
+              <a:buNone/>
+              <a:defRPr sz="1600"/>
             </a:lvl9pPr>
           </a:lstStyle>
           <a:p>
             <a:pPr lvl="0"/>
             <a:r>
-              <a:rPr lang="en-US"/>
+              <a:rPr lang="en-US" smtClean="0"/>
               <a:t>Click to edit Master text styles</a:t>
             </a:r>
           </a:p>
@@ -2355,7 +2366,7 @@
           <a:p>
             <a:fld id="{18A28253-4B93-4F10-A248-DA5D859E28EF}" type="datetimeFigureOut">
               <a:rPr lang="en-US" smtClean="0"/>
-              <a:t>11/2/2016</a:t>
+              <a:t>11/8/16</a:t>
             </a:fld>
             <a:endParaRPr lang="en-US"/>
           </a:p>
@@ -2406,7 +2417,7 @@
     </p:spTree>
     <p:extLst>
       <p:ext uri="{BB962C8B-B14F-4D97-AF65-F5344CB8AC3E}">
-        <p14:creationId xmlns:p14="http://schemas.microsoft.com/office/powerpoint/2010/main" val="2743008793"/>
+        <p14:creationId xmlns:p14="http://schemas.microsoft.com/office/powerpoint/2010/main" val="4240960737"/>
       </p:ext>
     </p:extLst>
   </p:cSld>
@@ -2450,8 +2461,8 @@
         </p:nvSpPr>
         <p:spPr>
           <a:xfrm>
-            <a:off x="1383030" y="535517"/>
-            <a:ext cx="17350740" cy="1944159"/>
+            <a:off x="1571625" y="584201"/>
+            <a:ext cx="19716750" cy="2120901"/>
           </a:xfrm>
           <a:prstGeom prst="rect">
             <a:avLst/>
@@ -2464,7 +2475,7 @@
           <a:lstStyle/>
           <a:p>
             <a:r>
-              <a:rPr lang="en-US"/>
+              <a:rPr lang="en-US" smtClean="0"/>
               <a:t>Click to edit Master title style</a:t>
             </a:r>
             <a:endParaRPr lang="en-US" dirty="0"/>
@@ -2483,8 +2494,8 @@
         </p:nvSpPr>
         <p:spPr>
           <a:xfrm>
-            <a:off x="1383030" y="2677584"/>
-            <a:ext cx="17350740" cy="6381962"/>
+            <a:off x="1571625" y="2921000"/>
+            <a:ext cx="19716750" cy="6962141"/>
           </a:xfrm>
           <a:prstGeom prst="rect">
             <a:avLst/>
@@ -2498,35 +2509,35 @@
           <a:p>
             <a:pPr lvl="0"/>
             <a:r>
-              <a:rPr lang="en-US"/>
+              <a:rPr lang="en-US" smtClean="0"/>
               <a:t>Click to edit Master text styles</a:t>
             </a:r>
           </a:p>
           <a:p>
             <a:pPr lvl="1"/>
             <a:r>
-              <a:rPr lang="en-US"/>
+              <a:rPr lang="en-US" smtClean="0"/>
               <a:t>Second level</a:t>
             </a:r>
           </a:p>
           <a:p>
             <a:pPr lvl="2"/>
             <a:r>
-              <a:rPr lang="en-US"/>
+              <a:rPr lang="en-US" smtClean="0"/>
               <a:t>Third level</a:t>
             </a:r>
           </a:p>
           <a:p>
             <a:pPr lvl="3"/>
             <a:r>
-              <a:rPr lang="en-US"/>
+              <a:rPr lang="en-US" smtClean="0"/>
               <a:t>Fourth level</a:t>
             </a:r>
           </a:p>
           <a:p>
             <a:pPr lvl="4"/>
             <a:r>
-              <a:rPr lang="en-US"/>
+              <a:rPr lang="en-US" smtClean="0"/>
               <a:t>Fifth level</a:t>
             </a:r>
             <a:endParaRPr lang="en-US" dirty="0"/>
@@ -2545,8 +2556,8 @@
         </p:nvSpPr>
         <p:spPr>
           <a:xfrm>
-            <a:off x="1383030" y="9322647"/>
-            <a:ext cx="4526280" cy="535517"/>
+            <a:off x="1571625" y="10170161"/>
+            <a:ext cx="5143500" cy="584200"/>
           </a:xfrm>
           <a:prstGeom prst="rect">
             <a:avLst/>
@@ -2556,7 +2567,7 @@
           <a:bodyPr vert="horz" lIns="91440" tIns="45720" rIns="91440" bIns="45720" rtlCol="0" anchor="ctr"/>
           <a:lstStyle>
             <a:lvl1pPr algn="l">
-              <a:defRPr sz="1760">
+              <a:defRPr sz="1920">
                 <a:solidFill>
                   <a:schemeClr val="tx1">
                     <a:tint val="75000"/>
@@ -2568,7 +2579,7 @@
           <a:p>
             <a:fld id="{18A28253-4B93-4F10-A248-DA5D859E28EF}" type="datetimeFigureOut">
               <a:rPr lang="en-US" smtClean="0"/>
-              <a:t>11/2/2016</a:t>
+              <a:t>11/8/16</a:t>
             </a:fld>
             <a:endParaRPr lang="en-US"/>
           </a:p>
@@ -2586,8 +2597,8 @@
         </p:nvSpPr>
         <p:spPr>
           <a:xfrm>
-            <a:off x="6663690" y="9322647"/>
-            <a:ext cx="6789420" cy="535517"/>
+            <a:off x="7572375" y="10170161"/>
+            <a:ext cx="7715250" cy="584200"/>
           </a:xfrm>
           <a:prstGeom prst="rect">
             <a:avLst/>
@@ -2597,7 +2608,7 @@
           <a:bodyPr vert="horz" lIns="91440" tIns="45720" rIns="91440" bIns="45720" rtlCol="0" anchor="ctr"/>
           <a:lstStyle>
             <a:lvl1pPr algn="ctr">
-              <a:defRPr sz="1760">
+              <a:defRPr sz="1920">
                 <a:solidFill>
                   <a:schemeClr val="tx1">
                     <a:tint val="75000"/>
@@ -2623,8 +2634,8 @@
         </p:nvSpPr>
         <p:spPr>
           <a:xfrm>
-            <a:off x="14207490" y="9322647"/>
-            <a:ext cx="4526280" cy="535517"/>
+            <a:off x="16144875" y="10170161"/>
+            <a:ext cx="5143500" cy="584200"/>
           </a:xfrm>
           <a:prstGeom prst="rect">
             <a:avLst/>
@@ -2634,7 +2645,7 @@
           <a:bodyPr vert="horz" lIns="91440" tIns="45720" rIns="91440" bIns="45720" rtlCol="0" anchor="ctr"/>
           <a:lstStyle>
             <a:lvl1pPr algn="r">
-              <a:defRPr sz="1760">
+              <a:defRPr sz="1920">
                 <a:solidFill>
                   <a:schemeClr val="tx1">
                     <a:tint val="75000"/>
@@ -2655,27 +2666,27 @@
     </p:spTree>
     <p:extLst>
       <p:ext uri="{BB962C8B-B14F-4D97-AF65-F5344CB8AC3E}">
-        <p14:creationId xmlns:p14="http://schemas.microsoft.com/office/powerpoint/2010/main" val="4067277793"/>
+        <p14:creationId xmlns:p14="http://schemas.microsoft.com/office/powerpoint/2010/main" val="3125609200"/>
       </p:ext>
     </p:extLst>
   </p:cSld>
   <p:clrMap bg1="lt1" tx1="dk1" bg2="lt2" tx2="dk2" accent1="accent1" accent2="accent2" accent3="accent3" accent4="accent4" accent5="accent5" accent6="accent6" hlink="hlink" folHlink="folHlink"/>
   <p:sldLayoutIdLst>
-    <p:sldLayoutId id="2147483865" r:id="rId1"/>
-    <p:sldLayoutId id="2147483866" r:id="rId2"/>
-    <p:sldLayoutId id="2147483867" r:id="rId3"/>
-    <p:sldLayoutId id="2147483868" r:id="rId4"/>
-    <p:sldLayoutId id="2147483869" r:id="rId5"/>
-    <p:sldLayoutId id="2147483870" r:id="rId6"/>
-    <p:sldLayoutId id="2147483871" r:id="rId7"/>
-    <p:sldLayoutId id="2147483872" r:id="rId8"/>
-    <p:sldLayoutId id="2147483873" r:id="rId9"/>
-    <p:sldLayoutId id="2147483874" r:id="rId10"/>
-    <p:sldLayoutId id="2147483875" r:id="rId11"/>
+    <p:sldLayoutId id="2147483901" r:id="rId1"/>
+    <p:sldLayoutId id="2147483902" r:id="rId2"/>
+    <p:sldLayoutId id="2147483903" r:id="rId3"/>
+    <p:sldLayoutId id="2147483904" r:id="rId4"/>
+    <p:sldLayoutId id="2147483905" r:id="rId5"/>
+    <p:sldLayoutId id="2147483906" r:id="rId6"/>
+    <p:sldLayoutId id="2147483907" r:id="rId7"/>
+    <p:sldLayoutId id="2147483908" r:id="rId8"/>
+    <p:sldLayoutId id="2147483909" r:id="rId9"/>
+    <p:sldLayoutId id="2147483910" r:id="rId10"/>
+    <p:sldLayoutId id="2147483911" r:id="rId11"/>
   </p:sldLayoutIdLst>
   <p:txStyles>
     <p:titleStyle>
-      <a:lvl1pPr algn="l" defTabSz="1341150" rtl="0" eaLnBrk="1" latinLnBrk="0" hangingPunct="1">
+      <a:lvl1pPr algn="l" defTabSz="1463040" rtl="0" eaLnBrk="1" latinLnBrk="0" hangingPunct="1">
         <a:lnSpc>
           <a:spcPct val="90000"/>
         </a:lnSpc>
@@ -2683,7 +2694,7 @@
           <a:spcPct val="0"/>
         </a:spcBef>
         <a:buNone/>
-        <a:defRPr sz="6453" kern="1200">
+        <a:defRPr sz="7040" kern="1200">
           <a:solidFill>
             <a:schemeClr val="tx1"/>
           </a:solidFill>
@@ -2694,16 +2705,16 @@
       </a:lvl1pPr>
     </p:titleStyle>
     <p:bodyStyle>
-      <a:lvl1pPr marL="335288" indent="-335288" algn="l" defTabSz="1341150" rtl="0" eaLnBrk="1" latinLnBrk="0" hangingPunct="1">
+      <a:lvl1pPr marL="365760" indent="-365760" algn="l" defTabSz="1463040" rtl="0" eaLnBrk="1" latinLnBrk="0" hangingPunct="1">
         <a:lnSpc>
           <a:spcPct val="90000"/>
         </a:lnSpc>
         <a:spcBef>
-          <a:spcPts val="1467"/>
+          <a:spcPts val="1600"/>
         </a:spcBef>
         <a:buFont typeface="Arial" panose="020B0604020202020204" pitchFamily="34" charset="0"/>
         <a:buChar char="•"/>
-        <a:defRPr sz="4107" kern="1200">
+        <a:defRPr sz="4480" kern="1200">
           <a:solidFill>
             <a:schemeClr val="tx1"/>
           </a:solidFill>
@@ -2712,16 +2723,16 @@
           <a:cs typeface="+mn-cs"/>
         </a:defRPr>
       </a:lvl1pPr>
-      <a:lvl2pPr marL="1005863" indent="-335288" algn="l" defTabSz="1341150" rtl="0" eaLnBrk="1" latinLnBrk="0" hangingPunct="1">
+      <a:lvl2pPr marL="1097280" indent="-365760" algn="l" defTabSz="1463040" rtl="0" eaLnBrk="1" latinLnBrk="0" hangingPunct="1">
         <a:lnSpc>
           <a:spcPct val="90000"/>
         </a:lnSpc>
         <a:spcBef>
-          <a:spcPts val="733"/>
+          <a:spcPts val="800"/>
         </a:spcBef>
         <a:buFont typeface="Arial" panose="020B0604020202020204" pitchFamily="34" charset="0"/>
         <a:buChar char="•"/>
-        <a:defRPr sz="3520" kern="1200">
+        <a:defRPr sz="3840" kern="1200">
           <a:solidFill>
             <a:schemeClr val="tx1"/>
           </a:solidFill>
@@ -2730,16 +2741,16 @@
           <a:cs typeface="+mn-cs"/>
         </a:defRPr>
       </a:lvl2pPr>
-      <a:lvl3pPr marL="1676438" indent="-335288" algn="l" defTabSz="1341150" rtl="0" eaLnBrk="1" latinLnBrk="0" hangingPunct="1">
+      <a:lvl3pPr marL="1828800" indent="-365760" algn="l" defTabSz="1463040" rtl="0" eaLnBrk="1" latinLnBrk="0" hangingPunct="1">
         <a:lnSpc>
           <a:spcPct val="90000"/>
         </a:lnSpc>
         <a:spcBef>
-          <a:spcPts val="733"/>
+          <a:spcPts val="800"/>
         </a:spcBef>
         <a:buFont typeface="Arial" panose="020B0604020202020204" pitchFamily="34" charset="0"/>
         <a:buChar char="•"/>
-        <a:defRPr sz="2933" kern="1200">
+        <a:defRPr sz="3200" kern="1200">
           <a:solidFill>
             <a:schemeClr val="tx1"/>
           </a:solidFill>
@@ -2748,16 +2759,16 @@
           <a:cs typeface="+mn-cs"/>
         </a:defRPr>
       </a:lvl3pPr>
-      <a:lvl4pPr marL="2347013" indent="-335288" algn="l" defTabSz="1341150" rtl="0" eaLnBrk="1" latinLnBrk="0" hangingPunct="1">
+      <a:lvl4pPr marL="2560320" indent="-365760" algn="l" defTabSz="1463040" rtl="0" eaLnBrk="1" latinLnBrk="0" hangingPunct="1">
         <a:lnSpc>
           <a:spcPct val="90000"/>
         </a:lnSpc>
         <a:spcBef>
-          <a:spcPts val="733"/>
+          <a:spcPts val="800"/>
         </a:spcBef>
         <a:buFont typeface="Arial" panose="020B0604020202020204" pitchFamily="34" charset="0"/>
         <a:buChar char="•"/>
-        <a:defRPr sz="2640" kern="1200">
+        <a:defRPr sz="2880" kern="1200">
           <a:solidFill>
             <a:schemeClr val="tx1"/>
           </a:solidFill>
@@ -2766,16 +2777,16 @@
           <a:cs typeface="+mn-cs"/>
         </a:defRPr>
       </a:lvl4pPr>
-      <a:lvl5pPr marL="3017589" indent="-335288" algn="l" defTabSz="1341150" rtl="0" eaLnBrk="1" latinLnBrk="0" hangingPunct="1">
+      <a:lvl5pPr marL="3291840" indent="-365760" algn="l" defTabSz="1463040" rtl="0" eaLnBrk="1" latinLnBrk="0" hangingPunct="1">
         <a:lnSpc>
           <a:spcPct val="90000"/>
         </a:lnSpc>
         <a:spcBef>
-          <a:spcPts val="733"/>
+          <a:spcPts val="800"/>
         </a:spcBef>
         <a:buFont typeface="Arial" panose="020B0604020202020204" pitchFamily="34" charset="0"/>
         <a:buChar char="•"/>
-        <a:defRPr sz="2640" kern="1200">
+        <a:defRPr sz="2880" kern="1200">
           <a:solidFill>
             <a:schemeClr val="tx1"/>
           </a:solidFill>
@@ -2784,16 +2795,16 @@
           <a:cs typeface="+mn-cs"/>
         </a:defRPr>
       </a:lvl5pPr>
-      <a:lvl6pPr marL="3688164" indent="-335288" algn="l" defTabSz="1341150" rtl="0" eaLnBrk="1" latinLnBrk="0" hangingPunct="1">
+      <a:lvl6pPr marL="4023360" indent="-365760" algn="l" defTabSz="1463040" rtl="0" eaLnBrk="1" latinLnBrk="0" hangingPunct="1">
         <a:lnSpc>
           <a:spcPct val="90000"/>
         </a:lnSpc>
         <a:spcBef>
-          <a:spcPts val="733"/>
+          <a:spcPts val="800"/>
         </a:spcBef>
         <a:buFont typeface="Arial" panose="020B0604020202020204" pitchFamily="34" charset="0"/>
         <a:buChar char="•"/>
-        <a:defRPr sz="2640" kern="1200">
+        <a:defRPr sz="2880" kern="1200">
           <a:solidFill>
             <a:schemeClr val="tx1"/>
           </a:solidFill>
@@ -2802,16 +2813,16 @@
           <a:cs typeface="+mn-cs"/>
         </a:defRPr>
       </a:lvl6pPr>
-      <a:lvl7pPr marL="4358739" indent="-335288" algn="l" defTabSz="1341150" rtl="0" eaLnBrk="1" latinLnBrk="0" hangingPunct="1">
+      <a:lvl7pPr marL="4754880" indent="-365760" algn="l" defTabSz="1463040" rtl="0" eaLnBrk="1" latinLnBrk="0" hangingPunct="1">
         <a:lnSpc>
           <a:spcPct val="90000"/>
         </a:lnSpc>
         <a:spcBef>
-          <a:spcPts val="733"/>
+          <a:spcPts val="800"/>
         </a:spcBef>
         <a:buFont typeface="Arial" panose="020B0604020202020204" pitchFamily="34" charset="0"/>
         <a:buChar char="•"/>
-        <a:defRPr sz="2640" kern="1200">
+        <a:defRPr sz="2880" kern="1200">
           <a:solidFill>
             <a:schemeClr val="tx1"/>
           </a:solidFill>
@@ -2820,16 +2831,16 @@
           <a:cs typeface="+mn-cs"/>
         </a:defRPr>
       </a:lvl7pPr>
-      <a:lvl8pPr marL="5029314" indent="-335288" algn="l" defTabSz="1341150" rtl="0" eaLnBrk="1" latinLnBrk="0" hangingPunct="1">
+      <a:lvl8pPr marL="5486400" indent="-365760" algn="l" defTabSz="1463040" rtl="0" eaLnBrk="1" latinLnBrk="0" hangingPunct="1">
         <a:lnSpc>
           <a:spcPct val="90000"/>
         </a:lnSpc>
         <a:spcBef>
-          <a:spcPts val="733"/>
+          <a:spcPts val="800"/>
         </a:spcBef>
         <a:buFont typeface="Arial" panose="020B0604020202020204" pitchFamily="34" charset="0"/>
         <a:buChar char="•"/>
-        <a:defRPr sz="2640" kern="1200">
+        <a:defRPr sz="2880" kern="1200">
           <a:solidFill>
             <a:schemeClr val="tx1"/>
           </a:solidFill>
@@ -2838,16 +2849,16 @@
           <a:cs typeface="+mn-cs"/>
         </a:defRPr>
       </a:lvl8pPr>
-      <a:lvl9pPr marL="5699890" indent="-335288" algn="l" defTabSz="1341150" rtl="0" eaLnBrk="1" latinLnBrk="0" hangingPunct="1">
+      <a:lvl9pPr marL="6217920" indent="-365760" algn="l" defTabSz="1463040" rtl="0" eaLnBrk="1" latinLnBrk="0" hangingPunct="1">
         <a:lnSpc>
           <a:spcPct val="90000"/>
         </a:lnSpc>
         <a:spcBef>
-          <a:spcPts val="733"/>
+          <a:spcPts val="800"/>
         </a:spcBef>
         <a:buFont typeface="Arial" panose="020B0604020202020204" pitchFamily="34" charset="0"/>
         <a:buChar char="•"/>
-        <a:defRPr sz="2640" kern="1200">
+        <a:defRPr sz="2880" kern="1200">
           <a:solidFill>
             <a:schemeClr val="tx1"/>
           </a:solidFill>
@@ -2861,8 +2872,8 @@
       <a:defPPr>
         <a:defRPr lang="en-US"/>
       </a:defPPr>
-      <a:lvl1pPr marL="0" algn="l" defTabSz="1341150" rtl="0" eaLnBrk="1" latinLnBrk="0" hangingPunct="1">
-        <a:defRPr sz="2640" kern="1200">
+      <a:lvl1pPr marL="0" algn="l" defTabSz="1463040" rtl="0" eaLnBrk="1" latinLnBrk="0" hangingPunct="1">
+        <a:defRPr sz="2880" kern="1200">
           <a:solidFill>
             <a:schemeClr val="tx1"/>
           </a:solidFill>
@@ -2871,8 +2882,8 @@
           <a:cs typeface="+mn-cs"/>
         </a:defRPr>
       </a:lvl1pPr>
-      <a:lvl2pPr marL="670575" algn="l" defTabSz="1341150" rtl="0" eaLnBrk="1" latinLnBrk="0" hangingPunct="1">
-        <a:defRPr sz="2640" kern="1200">
+      <a:lvl2pPr marL="731520" algn="l" defTabSz="1463040" rtl="0" eaLnBrk="1" latinLnBrk="0" hangingPunct="1">
+        <a:defRPr sz="2880" kern="1200">
           <a:solidFill>
             <a:schemeClr val="tx1"/>
           </a:solidFill>
@@ -2881,8 +2892,8 @@
           <a:cs typeface="+mn-cs"/>
         </a:defRPr>
       </a:lvl2pPr>
-      <a:lvl3pPr marL="1341150" algn="l" defTabSz="1341150" rtl="0" eaLnBrk="1" latinLnBrk="0" hangingPunct="1">
-        <a:defRPr sz="2640" kern="1200">
+      <a:lvl3pPr marL="1463040" algn="l" defTabSz="1463040" rtl="0" eaLnBrk="1" latinLnBrk="0" hangingPunct="1">
+        <a:defRPr sz="2880" kern="1200">
           <a:solidFill>
             <a:schemeClr val="tx1"/>
           </a:solidFill>
@@ -2891,8 +2902,8 @@
           <a:cs typeface="+mn-cs"/>
         </a:defRPr>
       </a:lvl3pPr>
-      <a:lvl4pPr marL="2011726" algn="l" defTabSz="1341150" rtl="0" eaLnBrk="1" latinLnBrk="0" hangingPunct="1">
-        <a:defRPr sz="2640" kern="1200">
+      <a:lvl4pPr marL="2194560" algn="l" defTabSz="1463040" rtl="0" eaLnBrk="1" latinLnBrk="0" hangingPunct="1">
+        <a:defRPr sz="2880" kern="1200">
           <a:solidFill>
             <a:schemeClr val="tx1"/>
           </a:solidFill>
@@ -2901,8 +2912,8 @@
           <a:cs typeface="+mn-cs"/>
         </a:defRPr>
       </a:lvl4pPr>
-      <a:lvl5pPr marL="2682301" algn="l" defTabSz="1341150" rtl="0" eaLnBrk="1" latinLnBrk="0" hangingPunct="1">
-        <a:defRPr sz="2640" kern="1200">
+      <a:lvl5pPr marL="2926080" algn="l" defTabSz="1463040" rtl="0" eaLnBrk="1" latinLnBrk="0" hangingPunct="1">
+        <a:defRPr sz="2880" kern="1200">
           <a:solidFill>
             <a:schemeClr val="tx1"/>
           </a:solidFill>
@@ -2911,8 +2922,8 @@
           <a:cs typeface="+mn-cs"/>
         </a:defRPr>
       </a:lvl5pPr>
-      <a:lvl6pPr marL="3352876" algn="l" defTabSz="1341150" rtl="0" eaLnBrk="1" latinLnBrk="0" hangingPunct="1">
-        <a:defRPr sz="2640" kern="1200">
+      <a:lvl6pPr marL="3657600" algn="l" defTabSz="1463040" rtl="0" eaLnBrk="1" latinLnBrk="0" hangingPunct="1">
+        <a:defRPr sz="2880" kern="1200">
           <a:solidFill>
             <a:schemeClr val="tx1"/>
           </a:solidFill>
@@ -2921,8 +2932,8 @@
           <a:cs typeface="+mn-cs"/>
         </a:defRPr>
       </a:lvl6pPr>
-      <a:lvl7pPr marL="4023451" algn="l" defTabSz="1341150" rtl="0" eaLnBrk="1" latinLnBrk="0" hangingPunct="1">
-        <a:defRPr sz="2640" kern="1200">
+      <a:lvl7pPr marL="4389120" algn="l" defTabSz="1463040" rtl="0" eaLnBrk="1" latinLnBrk="0" hangingPunct="1">
+        <a:defRPr sz="2880" kern="1200">
           <a:solidFill>
             <a:schemeClr val="tx1"/>
           </a:solidFill>
@@ -2931,8 +2942,8 @@
           <a:cs typeface="+mn-cs"/>
         </a:defRPr>
       </a:lvl7pPr>
-      <a:lvl8pPr marL="4694027" algn="l" defTabSz="1341150" rtl="0" eaLnBrk="1" latinLnBrk="0" hangingPunct="1">
-        <a:defRPr sz="2640" kern="1200">
+      <a:lvl8pPr marL="5120640" algn="l" defTabSz="1463040" rtl="0" eaLnBrk="1" latinLnBrk="0" hangingPunct="1">
+        <a:defRPr sz="2880" kern="1200">
           <a:solidFill>
             <a:schemeClr val="tx1"/>
           </a:solidFill>
@@ -2941,8 +2952,8 @@
           <a:cs typeface="+mn-cs"/>
         </a:defRPr>
       </a:lvl8pPr>
-      <a:lvl9pPr marL="5364602" algn="l" defTabSz="1341150" rtl="0" eaLnBrk="1" latinLnBrk="0" hangingPunct="1">
-        <a:defRPr sz="2640" kern="1200">
+      <a:lvl9pPr marL="5852160" algn="l" defTabSz="1463040" rtl="0" eaLnBrk="1" latinLnBrk="0" hangingPunct="1">
+        <a:defRPr sz="2880" kern="1200">
           <a:solidFill>
             <a:schemeClr val="tx1"/>
           </a:solidFill>
@@ -2981,8 +2992,8 @@
         </p:nvSpPr>
         <p:spPr>
           <a:xfrm>
-            <a:off x="564237" y="596523"/>
-            <a:ext cx="2420471" cy="806824"/>
+            <a:off x="179963" y="229460"/>
+            <a:ext cx="3200400" cy="1005840"/>
           </a:xfrm>
           <a:prstGeom prst="roundRect">
             <a:avLst/>
@@ -3018,17 +3029,17 @@
           <a:p>
             <a:pPr algn="ctr"/>
             <a:r>
-              <a:rPr lang="en-US" sz="2000" dirty="0"/>
+              <a:rPr lang="en-US" sz="2800" dirty="0"/>
               <a:t>Method Declaration</a:t>
             </a:r>
           </a:p>
           <a:p>
             <a:pPr algn="ctr"/>
             <a:r>
-              <a:rPr lang="en-US" sz="2000" i="1" dirty="0" err="1"/>
+              <a:rPr lang="en-US" sz="2800" i="1" dirty="0" err="1"/>
               <a:t>handleMessage</a:t>
             </a:r>
-            <a:endParaRPr lang="en-US" sz="2000" i="1" dirty="0"/>
+            <a:endParaRPr lang="en-US" sz="2800" i="1" dirty="0"/>
           </a:p>
         </p:txBody>
       </p:sp>
@@ -3040,8 +3051,8 @@
         </p:nvSpPr>
         <p:spPr>
           <a:xfrm>
-            <a:off x="2601219" y="1664135"/>
-            <a:ext cx="2420471" cy="806824"/>
+            <a:off x="2666543" y="1598254"/>
+            <a:ext cx="3200400" cy="1005840"/>
           </a:xfrm>
           <a:prstGeom prst="roundRect">
             <a:avLst/>
@@ -3077,7 +3088,7 @@
           <a:p>
             <a:pPr algn="ctr"/>
             <a:r>
-              <a:rPr lang="en-US" sz="2000" dirty="0"/>
+              <a:rPr lang="en-US" sz="2800" dirty="0"/>
               <a:t>Parameter</a:t>
             </a:r>
           </a:p>
@@ -3091,8 +3102,8 @@
         </p:nvSpPr>
         <p:spPr>
           <a:xfrm>
-            <a:off x="2601218" y="2750871"/>
-            <a:ext cx="2420471" cy="806824"/>
+            <a:off x="2666543" y="2867881"/>
+            <a:ext cx="3200400" cy="1005840"/>
           </a:xfrm>
           <a:prstGeom prst="roundRect">
             <a:avLst/>
@@ -3128,7 +3139,7 @@
           <a:p>
             <a:pPr algn="ctr"/>
             <a:r>
-              <a:rPr lang="en-US" sz="2000" dirty="0"/>
+              <a:rPr lang="en-US" sz="2800" dirty="0"/>
               <a:t>Block</a:t>
             </a:r>
           </a:p>
@@ -3142,8 +3153,8 @@
         </p:nvSpPr>
         <p:spPr>
           <a:xfrm>
-            <a:off x="4646093" y="7183644"/>
-            <a:ext cx="2420471" cy="806824"/>
+            <a:off x="4949614" y="8052042"/>
+            <a:ext cx="3200400" cy="1005840"/>
           </a:xfrm>
           <a:prstGeom prst="roundRect">
             <a:avLst/>
@@ -3178,18 +3189,18 @@
           <a:lstStyle/>
           <a:p>
             <a:pPr algn="ctr"/>
-            <a:endParaRPr lang="en-US" sz="2000" dirty="0"/>
+            <a:endParaRPr lang="en-US" sz="2800" dirty="0"/>
           </a:p>
           <a:p>
             <a:pPr algn="ctr"/>
             <a:r>
-              <a:rPr lang="en-US" sz="2000" dirty="0"/>
+              <a:rPr lang="en-US" sz="2800" dirty="0"/>
               <a:t>Assignment </a:t>
             </a:r>
           </a:p>
           <a:p>
             <a:pPr algn="ctr"/>
-            <a:endParaRPr lang="en-US" sz="2000" dirty="0"/>
+            <a:endParaRPr lang="en-US" sz="2800" dirty="0"/>
           </a:p>
         </p:txBody>
       </p:sp>
@@ -3201,8 +3212,8 @@
         </p:nvSpPr>
         <p:spPr>
           <a:xfrm>
-            <a:off x="6715841" y="4936948"/>
-            <a:ext cx="2420471" cy="806824"/>
+            <a:off x="7355108" y="5479463"/>
+            <a:ext cx="3200400" cy="1005840"/>
           </a:xfrm>
           <a:prstGeom prst="roundRect">
             <a:avLst/>
@@ -3238,7 +3249,7 @@
           <a:p>
             <a:pPr algn="ctr"/>
             <a:r>
-              <a:rPr lang="en-US" sz="2000" dirty="0"/>
+              <a:rPr lang="en-US" sz="2800" dirty="0"/>
               <a:t>Expression</a:t>
             </a:r>
           </a:p>
@@ -3252,8 +3263,8 @@
         </p:nvSpPr>
         <p:spPr>
           <a:xfrm>
-            <a:off x="4646093" y="3831773"/>
-            <a:ext cx="2420471" cy="806824"/>
+            <a:off x="4949614" y="4201213"/>
+            <a:ext cx="3200400" cy="1005840"/>
           </a:xfrm>
           <a:prstGeom prst="roundRect">
             <a:avLst/>
@@ -3289,7 +3300,7 @@
           <a:p>
             <a:pPr algn="ctr"/>
             <a:r>
-              <a:rPr lang="en-US" sz="2000" dirty="0"/>
+              <a:rPr lang="en-US" sz="2800" dirty="0"/>
               <a:t>If Statement</a:t>
             </a:r>
           </a:p>
@@ -3306,8 +3317,8 @@
         </p:nvCxnSpPr>
         <p:spPr>
           <a:xfrm rot="16200000" flipH="1">
-            <a:off x="1855746" y="1322074"/>
-            <a:ext cx="664200" cy="826746"/>
+            <a:off x="1790415" y="1225047"/>
+            <a:ext cx="865874" cy="886381"/>
           </a:xfrm>
           <a:prstGeom prst="bentConnector2">
             <a:avLst/>
@@ -3353,8 +3364,8 @@
         </p:nvCxnSpPr>
         <p:spPr>
           <a:xfrm rot="16200000" flipH="1">
-            <a:off x="1644480" y="2197543"/>
-            <a:ext cx="1086735" cy="826746"/>
+            <a:off x="1588538" y="2292795"/>
+            <a:ext cx="1269627" cy="886383"/>
           </a:xfrm>
           <a:prstGeom prst="bentConnector2">
             <a:avLst/>
@@ -3400,8 +3411,8 @@
         </p:nvCxnSpPr>
         <p:spPr>
           <a:xfrm rot="16200000" flipH="1">
-            <a:off x="2552836" y="5493798"/>
-            <a:ext cx="3351871" cy="834644"/>
+            <a:off x="2667575" y="6272922"/>
+            <a:ext cx="3881209" cy="682871"/>
           </a:xfrm>
           <a:prstGeom prst="bentConnector2">
             <a:avLst/>
@@ -3448,8 +3459,8 @@
         </p:nvCxnSpPr>
         <p:spPr>
           <a:xfrm rot="16200000" flipH="1">
-            <a:off x="5935200" y="4559721"/>
-            <a:ext cx="701765" cy="859512"/>
+            <a:off x="6564796" y="5192071"/>
+            <a:ext cx="775330" cy="805294"/>
           </a:xfrm>
           <a:prstGeom prst="bentConnector2">
             <a:avLst/>
@@ -3489,14 +3500,15 @@
         <p:nvCxnSpPr>
           <p:cNvPr id="66" name="Elbow Connector 65"/>
           <p:cNvCxnSpPr>
-            <a:endCxn id="68" idx="1"/>
+            <a:stCxn id="53" idx="2"/>
+            <a:endCxn id="57" idx="1"/>
           </p:cNvCxnSpPr>
           <p:nvPr/>
         </p:nvCxnSpPr>
         <p:spPr>
           <a:xfrm rot="16200000" flipH="1">
-            <a:off x="5714371" y="5467985"/>
-            <a:ext cx="1147878" cy="879914"/>
+            <a:off x="4192973" y="3947493"/>
+            <a:ext cx="830412" cy="682871"/>
           </a:xfrm>
           <a:prstGeom prst="bentConnector2">
             <a:avLst/>
@@ -3540,8 +3552,8 @@
         </p:nvSpPr>
         <p:spPr>
           <a:xfrm>
-            <a:off x="6728267" y="6078469"/>
-            <a:ext cx="2420471" cy="806824"/>
+            <a:off x="7355108" y="6775882"/>
+            <a:ext cx="3200400" cy="1005840"/>
           </a:xfrm>
           <a:prstGeom prst="roundRect">
             <a:avLst/>
@@ -3577,14 +3589,14 @@
           <a:p>
             <a:pPr algn="ctr"/>
             <a:r>
-              <a:rPr lang="en-US" sz="2000" dirty="0"/>
+              <a:rPr lang="en-US" sz="2800" dirty="0"/>
               <a:t>Then Part</a:t>
             </a:r>
           </a:p>
           <a:p>
             <a:pPr algn="ctr"/>
             <a:r>
-              <a:rPr lang="en-US" sz="2000" dirty="0"/>
+              <a:rPr lang="en-US" sz="2800" dirty="0"/>
               <a:t>Return Statement</a:t>
             </a:r>
           </a:p>
@@ -3598,8 +3610,8 @@
         </p:nvSpPr>
         <p:spPr>
           <a:xfrm>
-            <a:off x="4646093" y="8288819"/>
-            <a:ext cx="2420471" cy="806824"/>
+            <a:off x="4949614" y="9346688"/>
+            <a:ext cx="3200400" cy="1005840"/>
           </a:xfrm>
           <a:prstGeom prst="roundRect">
             <a:avLst/>
@@ -3634,12 +3646,12 @@
           <a:lstStyle/>
           <a:p>
             <a:pPr algn="ctr"/>
-            <a:endParaRPr lang="en-US" sz="2000" dirty="0"/>
+            <a:endParaRPr lang="en-US" sz="2800" dirty="0"/>
           </a:p>
           <a:p>
             <a:pPr algn="ctr"/>
             <a:r>
-              <a:rPr lang="en-US" sz="2000" dirty="0">
+              <a:rPr lang="en-US" sz="2800" dirty="0">
                 <a:solidFill>
                   <a:srgbClr val="C00000"/>
                 </a:solidFill>
@@ -3649,7 +3661,7 @@
           </a:p>
           <a:p>
             <a:pPr algn="ctr"/>
-            <a:endParaRPr lang="en-US" sz="2000" dirty="0"/>
+            <a:endParaRPr lang="en-US" sz="2800" dirty="0"/>
           </a:p>
         </p:txBody>
       </p:sp>
@@ -3663,8 +3675,8 @@
         </p:nvCxnSpPr>
         <p:spPr>
           <a:xfrm rot="16200000" flipH="1">
-            <a:off x="3676186" y="7722328"/>
-            <a:ext cx="1105175" cy="834641"/>
+            <a:off x="3960856" y="8860850"/>
+            <a:ext cx="1294644" cy="682871"/>
           </a:xfrm>
           <a:prstGeom prst="bentConnector2">
             <a:avLst/>
@@ -3700,19 +3712,70 @@
           </a:fontRef>
         </p:style>
       </p:cxnSp>
+      <p:sp>
+        <p:nvSpPr>
+          <p:cNvPr id="73" name="Rounded Rectangle 72"/>
+          <p:cNvSpPr/>
+          <p:nvPr/>
+        </p:nvSpPr>
+        <p:spPr>
+          <a:xfrm>
+            <a:off x="19293437" y="6864676"/>
+            <a:ext cx="3200400" cy="1005840"/>
+          </a:xfrm>
+          <a:prstGeom prst="roundRect">
+            <a:avLst/>
+          </a:prstGeom>
+          <a:noFill/>
+          <a:ln w="31750">
+            <a:solidFill>
+              <a:schemeClr val="tx1">
+                <a:alpha val="63000"/>
+              </a:schemeClr>
+            </a:solidFill>
+            <a:headEnd w="lg" len="lg"/>
+            <a:tailEnd type="triangle"/>
+          </a:ln>
+        </p:spPr>
+        <p:style>
+          <a:lnRef idx="1">
+            <a:schemeClr val="accent1"/>
+          </a:lnRef>
+          <a:fillRef idx="0">
+            <a:schemeClr val="accent1"/>
+          </a:fillRef>
+          <a:effectRef idx="0">
+            <a:schemeClr val="accent1"/>
+          </a:effectRef>
+          <a:fontRef idx="minor">
+            <a:schemeClr val="tx1"/>
+          </a:fontRef>
+        </p:style>
+        <p:txBody>
+          <a:bodyPr rtlCol="0" anchor="ctr"/>
+          <a:lstStyle/>
+          <a:p>
+            <a:pPr algn="ctr"/>
+            <a:r>
+              <a:rPr lang="en-US" sz="2800" dirty="0"/>
+              <a:t>Expression</a:t>
+            </a:r>
+          </a:p>
+        </p:txBody>
+      </p:sp>
       <p:cxnSp>
         <p:nvCxnSpPr>
-          <p:cNvPr id="77" name="Elbow Connector 76"/>
+          <p:cNvPr id="79" name="Elbow Connector 78"/>
           <p:cNvCxnSpPr>
-            <a:stCxn id="53" idx="2"/>
-            <a:endCxn id="57" idx="1"/>
+            <a:stCxn id="130" idx="2"/>
+            <a:endCxn id="73" idx="1"/>
           </p:cNvCxnSpPr>
           <p:nvPr/>
         </p:nvCxnSpPr>
         <p:spPr>
           <a:xfrm rot="16200000" flipH="1">
-            <a:off x="3890024" y="3479121"/>
-            <a:ext cx="677490" cy="834640"/>
+            <a:off x="18495749" y="6569910"/>
+            <a:ext cx="790082" cy="805293"/>
           </a:xfrm>
           <a:prstGeom prst="bentConnector2">
             <a:avLst/>
@@ -3750,14 +3813,14 @@
       </p:cxnSp>
       <p:sp>
         <p:nvSpPr>
-          <p:cNvPr id="73" name="Rounded Rectangle 72"/>
+          <p:cNvPr id="85" name="Rounded Rectangle 84"/>
           <p:cNvSpPr/>
           <p:nvPr/>
         </p:nvSpPr>
         <p:spPr>
           <a:xfrm>
-            <a:off x="17245600" y="6254382"/>
-            <a:ext cx="2420471" cy="806824"/>
+            <a:off x="19293437" y="9504020"/>
+            <a:ext cx="3200400" cy="1005840"/>
           </a:xfrm>
           <a:prstGeom prst="roundRect">
             <a:avLst/>
@@ -3793,25 +3856,31 @@
           <a:p>
             <a:pPr algn="ctr"/>
             <a:r>
-              <a:rPr lang="en-US" sz="2000" dirty="0"/>
-              <a:t>Expression</a:t>
+              <a:rPr lang="en-US" sz="2800" dirty="0"/>
+              <a:t>Else Part</a:t>
+            </a:r>
+          </a:p>
+          <a:p>
+            <a:pPr algn="ctr"/>
+            <a:r>
+              <a:rPr lang="en-US" sz="2800" dirty="0"/>
+              <a:t>Statement</a:t>
             </a:r>
           </a:p>
         </p:txBody>
       </p:sp>
       <p:cxnSp>
         <p:nvCxnSpPr>
-          <p:cNvPr id="79" name="Elbow Connector 78"/>
+          <p:cNvPr id="86" name="Elbow Connector 85"/>
           <p:cNvCxnSpPr>
-            <a:stCxn id="130" idx="2"/>
-            <a:endCxn id="73" idx="1"/>
+            <a:endCxn id="85" idx="1"/>
           </p:cNvCxnSpPr>
           <p:nvPr/>
         </p:nvCxnSpPr>
         <p:spPr>
           <a:xfrm rot="16200000" flipH="1">
-            <a:off x="16436030" y="5848224"/>
-            <a:ext cx="726796" cy="892344"/>
+            <a:off x="18214624" y="8928124"/>
+            <a:ext cx="1352337" cy="805295"/>
           </a:xfrm>
           <a:prstGeom prst="bentConnector2">
             <a:avLst/>
@@ -3849,14 +3918,14 @@
       </p:cxnSp>
       <p:sp>
         <p:nvSpPr>
-          <p:cNvPr id="85" name="Rounded Rectangle 84"/>
+          <p:cNvPr id="125" name="Rounded Rectangle 124"/>
           <p:cNvSpPr/>
           <p:nvPr/>
         </p:nvSpPr>
         <p:spPr>
           <a:xfrm>
-            <a:off x="17245600" y="8395308"/>
-            <a:ext cx="2420471" cy="806824"/>
+            <a:off x="12153107" y="229460"/>
+            <a:ext cx="3200400" cy="1005840"/>
           </a:xfrm>
           <a:prstGeom prst="roundRect">
             <a:avLst/>
@@ -3892,31 +3961,314 @@
           <a:p>
             <a:pPr algn="ctr"/>
             <a:r>
-              <a:rPr lang="en-US" sz="2000" dirty="0"/>
-              <a:t>Else Part</a:t>
+              <a:rPr lang="en-US" sz="2800" dirty="0"/>
+              <a:t>Method Declaration</a:t>
             </a:r>
           </a:p>
           <a:p>
             <a:pPr algn="ctr"/>
             <a:r>
-              <a:rPr lang="en-US" sz="2000" dirty="0"/>
-              <a:t>Statement</a:t>
+              <a:rPr lang="en-US" sz="2800" i="1" dirty="0" err="1"/>
+              <a:t>actionPerformed</a:t>
+            </a:r>
+            <a:endParaRPr lang="en-US" sz="2800" i="1" dirty="0"/>
+          </a:p>
+        </p:txBody>
+      </p:sp>
+      <p:sp>
+        <p:nvSpPr>
+          <p:cNvPr id="126" name="Rounded Rectangle 125"/>
+          <p:cNvSpPr/>
+          <p:nvPr/>
+        </p:nvSpPr>
+        <p:spPr>
+          <a:xfrm>
+            <a:off x="14549863" y="1557315"/>
+            <a:ext cx="3200400" cy="1005840"/>
+          </a:xfrm>
+          <a:prstGeom prst="roundRect">
+            <a:avLst/>
+          </a:prstGeom>
+          <a:noFill/>
+          <a:ln w="31750">
+            <a:solidFill>
+              <a:schemeClr val="tx1">
+                <a:alpha val="63000"/>
+              </a:schemeClr>
+            </a:solidFill>
+            <a:headEnd w="lg" len="lg"/>
+            <a:tailEnd type="triangle"/>
+          </a:ln>
+        </p:spPr>
+        <p:style>
+          <a:lnRef idx="1">
+            <a:schemeClr val="accent1"/>
+          </a:lnRef>
+          <a:fillRef idx="0">
+            <a:schemeClr val="accent1"/>
+          </a:fillRef>
+          <a:effectRef idx="0">
+            <a:schemeClr val="accent1"/>
+          </a:effectRef>
+          <a:fontRef idx="minor">
+            <a:schemeClr val="tx1"/>
+          </a:fontRef>
+        </p:style>
+        <p:txBody>
+          <a:bodyPr rtlCol="0" anchor="ctr"/>
+          <a:lstStyle/>
+          <a:p>
+            <a:pPr algn="ctr"/>
+            <a:r>
+              <a:rPr lang="en-US" sz="2800" dirty="0"/>
+              <a:t>Parameter</a:t>
+            </a:r>
+          </a:p>
+        </p:txBody>
+      </p:sp>
+      <p:sp>
+        <p:nvSpPr>
+          <p:cNvPr id="127" name="Rounded Rectangle 126"/>
+          <p:cNvSpPr/>
+          <p:nvPr/>
+        </p:nvSpPr>
+        <p:spPr>
+          <a:xfrm>
+            <a:off x="14604874" y="2816795"/>
+            <a:ext cx="3200400" cy="1005840"/>
+          </a:xfrm>
+          <a:prstGeom prst="roundRect">
+            <a:avLst/>
+          </a:prstGeom>
+          <a:noFill/>
+          <a:ln w="31750">
+            <a:solidFill>
+              <a:schemeClr val="tx1">
+                <a:alpha val="63000"/>
+              </a:schemeClr>
+            </a:solidFill>
+            <a:headEnd w="lg" len="lg"/>
+            <a:tailEnd type="triangle"/>
+          </a:ln>
+        </p:spPr>
+        <p:style>
+          <a:lnRef idx="1">
+            <a:schemeClr val="accent1"/>
+          </a:lnRef>
+          <a:fillRef idx="0">
+            <a:schemeClr val="accent1"/>
+          </a:fillRef>
+          <a:effectRef idx="0">
+            <a:schemeClr val="accent1"/>
+          </a:effectRef>
+          <a:fontRef idx="minor">
+            <a:schemeClr val="tx1"/>
+          </a:fontRef>
+        </p:style>
+        <p:txBody>
+          <a:bodyPr rtlCol="0" anchor="ctr"/>
+          <a:lstStyle/>
+          <a:p>
+            <a:pPr algn="ctr"/>
+            <a:r>
+              <a:rPr lang="en-US" sz="2800" dirty="0"/>
+              <a:t>Block</a:t>
+            </a:r>
+          </a:p>
+        </p:txBody>
+      </p:sp>
+      <p:sp>
+        <p:nvSpPr>
+          <p:cNvPr id="128" name="Rounded Rectangle 127"/>
+          <p:cNvSpPr/>
+          <p:nvPr/>
+        </p:nvSpPr>
+        <p:spPr>
+          <a:xfrm>
+            <a:off x="16894808" y="4278672"/>
+            <a:ext cx="3631138" cy="1005840"/>
+          </a:xfrm>
+          <a:prstGeom prst="roundRect">
+            <a:avLst/>
+          </a:prstGeom>
+          <a:noFill/>
+          <a:ln w="31750">
+            <a:solidFill>
+              <a:schemeClr val="tx1">
+                <a:alpha val="63000"/>
+              </a:schemeClr>
+            </a:solidFill>
+            <a:headEnd w="lg" len="lg"/>
+            <a:tailEnd type="triangle"/>
+          </a:ln>
+        </p:spPr>
+        <p:style>
+          <a:lnRef idx="1">
+            <a:schemeClr val="accent1"/>
+          </a:lnRef>
+          <a:fillRef idx="0">
+            <a:schemeClr val="accent1"/>
+          </a:fillRef>
+          <a:effectRef idx="0">
+            <a:schemeClr val="accent1"/>
+          </a:effectRef>
+          <a:fontRef idx="minor">
+            <a:schemeClr val="tx1"/>
+          </a:fontRef>
+        </p:style>
+        <p:txBody>
+          <a:bodyPr rtlCol="0" anchor="ctr"/>
+          <a:lstStyle/>
+          <a:p>
+            <a:pPr algn="ctr"/>
+            <a:endParaRPr lang="en-US" sz="2800" dirty="0"/>
+          </a:p>
+          <a:p>
+            <a:pPr algn="ctr"/>
+            <a:r>
+              <a:rPr lang="en-US" sz="2800" dirty="0"/>
+              <a:t>Variable Declaration</a:t>
+            </a:r>
+          </a:p>
+          <a:p>
+            <a:pPr algn="ctr"/>
+            <a:r>
+              <a:rPr lang="en-US" sz="2800" dirty="0"/>
+              <a:t>Statement </a:t>
+            </a:r>
+          </a:p>
+          <a:p>
+            <a:pPr algn="ctr"/>
+            <a:endParaRPr lang="en-US" sz="2800" dirty="0"/>
+          </a:p>
+        </p:txBody>
+      </p:sp>
+      <p:sp>
+        <p:nvSpPr>
+          <p:cNvPr id="129" name="Rounded Rectangle 128"/>
+          <p:cNvSpPr/>
+          <p:nvPr/>
+        </p:nvSpPr>
+        <p:spPr>
+          <a:xfrm>
+            <a:off x="19293437" y="8151682"/>
+            <a:ext cx="3200400" cy="1005840"/>
+          </a:xfrm>
+          <a:prstGeom prst="roundRect">
+            <a:avLst/>
+          </a:prstGeom>
+          <a:noFill/>
+          <a:ln w="31750">
+            <a:solidFill>
+              <a:schemeClr val="tx1">
+                <a:alpha val="63000"/>
+              </a:schemeClr>
+            </a:solidFill>
+            <a:headEnd w="lg" len="lg"/>
+            <a:tailEnd type="triangle"/>
+          </a:ln>
+        </p:spPr>
+        <p:style>
+          <a:lnRef idx="1">
+            <a:schemeClr val="accent1"/>
+          </a:lnRef>
+          <a:fillRef idx="0">
+            <a:schemeClr val="accent1"/>
+          </a:fillRef>
+          <a:effectRef idx="0">
+            <a:schemeClr val="accent1"/>
+          </a:effectRef>
+          <a:fontRef idx="minor">
+            <a:schemeClr val="tx1"/>
+          </a:fontRef>
+        </p:style>
+        <p:txBody>
+          <a:bodyPr rtlCol="0" anchor="ctr"/>
+          <a:lstStyle/>
+          <a:p>
+            <a:pPr algn="ctr"/>
+            <a:r>
+              <a:rPr lang="en-US" sz="2800" dirty="0"/>
+              <a:t>Then Part</a:t>
+            </a:r>
+          </a:p>
+          <a:p>
+            <a:pPr algn="ctr"/>
+            <a:r>
+              <a:rPr lang="en-US" sz="2800" dirty="0">
+                <a:solidFill>
+                  <a:srgbClr val="C00000"/>
+                </a:solidFill>
+              </a:rPr>
+              <a:t>Log Statement</a:t>
+            </a:r>
+          </a:p>
+        </p:txBody>
+      </p:sp>
+      <p:sp>
+        <p:nvSpPr>
+          <p:cNvPr id="130" name="Rounded Rectangle 129"/>
+          <p:cNvSpPr/>
+          <p:nvPr/>
+        </p:nvSpPr>
+        <p:spPr>
+          <a:xfrm>
+            <a:off x="16887944" y="5571674"/>
+            <a:ext cx="3200400" cy="1005840"/>
+          </a:xfrm>
+          <a:prstGeom prst="roundRect">
+            <a:avLst/>
+          </a:prstGeom>
+          <a:noFill/>
+          <a:ln w="31750">
+            <a:solidFill>
+              <a:schemeClr val="tx1">
+                <a:alpha val="63000"/>
+              </a:schemeClr>
+            </a:solidFill>
+            <a:headEnd w="lg" len="lg"/>
+            <a:tailEnd type="triangle"/>
+          </a:ln>
+        </p:spPr>
+        <p:style>
+          <a:lnRef idx="1">
+            <a:schemeClr val="accent1"/>
+          </a:lnRef>
+          <a:fillRef idx="0">
+            <a:schemeClr val="accent1"/>
+          </a:fillRef>
+          <a:effectRef idx="0">
+            <a:schemeClr val="accent1"/>
+          </a:effectRef>
+          <a:fontRef idx="minor">
+            <a:schemeClr val="tx1"/>
+          </a:fontRef>
+        </p:style>
+        <p:txBody>
+          <a:bodyPr rtlCol="0" anchor="ctr"/>
+          <a:lstStyle/>
+          <a:p>
+            <a:pPr algn="ctr"/>
+            <a:r>
+              <a:rPr lang="en-US" sz="2800" dirty="0"/>
+              <a:t>If Statement</a:t>
             </a:r>
           </a:p>
         </p:txBody>
       </p:sp>
       <p:cxnSp>
         <p:nvCxnSpPr>
-          <p:cNvPr id="86" name="Elbow Connector 85"/>
+          <p:cNvPr id="131" name="Elbow Connector 130"/>
           <p:cNvCxnSpPr>
-            <a:endCxn id="85" idx="1"/>
+            <a:stCxn id="125" idx="2"/>
+            <a:endCxn id="126" idx="1"/>
           </p:cNvCxnSpPr>
           <p:nvPr/>
         </p:nvCxnSpPr>
         <p:spPr>
           <a:xfrm rot="16200000" flipH="1">
-            <a:off x="16253914" y="7807033"/>
-            <a:ext cx="1091031" cy="892342"/>
+            <a:off x="13739118" y="1249489"/>
+            <a:ext cx="824935" cy="796556"/>
           </a:xfrm>
           <a:prstGeom prst="bentConnector2">
             <a:avLst/>
@@ -3952,359 +4304,18 @@
           </a:fontRef>
         </p:style>
       </p:cxnSp>
-      <p:sp>
-        <p:nvSpPr>
-          <p:cNvPr id="125" name="Rounded Rectangle 124"/>
-          <p:cNvSpPr/>
-          <p:nvPr/>
-        </p:nvSpPr>
-        <p:spPr>
-          <a:xfrm>
-            <a:off x="11036289" y="596523"/>
-            <a:ext cx="2420471" cy="806824"/>
-          </a:xfrm>
-          <a:prstGeom prst="roundRect">
-            <a:avLst/>
-          </a:prstGeom>
-          <a:noFill/>
-          <a:ln w="31750">
-            <a:solidFill>
-              <a:schemeClr val="tx1">
-                <a:alpha val="63000"/>
-              </a:schemeClr>
-            </a:solidFill>
-            <a:headEnd w="lg" len="lg"/>
-            <a:tailEnd type="triangle"/>
-          </a:ln>
-        </p:spPr>
-        <p:style>
-          <a:lnRef idx="1">
-            <a:schemeClr val="accent1"/>
-          </a:lnRef>
-          <a:fillRef idx="0">
-            <a:schemeClr val="accent1"/>
-          </a:fillRef>
-          <a:effectRef idx="0">
-            <a:schemeClr val="accent1"/>
-          </a:effectRef>
-          <a:fontRef idx="minor">
-            <a:schemeClr val="tx1"/>
-          </a:fontRef>
-        </p:style>
-        <p:txBody>
-          <a:bodyPr rtlCol="0" anchor="ctr"/>
-          <a:lstStyle/>
-          <a:p>
-            <a:pPr algn="ctr"/>
-            <a:r>
-              <a:rPr lang="en-US" sz="2000" dirty="0"/>
-              <a:t>Method Declaration</a:t>
-            </a:r>
-          </a:p>
-          <a:p>
-            <a:pPr algn="ctr"/>
-            <a:r>
-              <a:rPr lang="en-US" sz="2000" i="1" dirty="0" err="1"/>
-              <a:t>actionPerformed</a:t>
-            </a:r>
-            <a:endParaRPr lang="en-US" sz="2000" i="1" dirty="0"/>
-          </a:p>
-        </p:txBody>
-      </p:sp>
-      <p:sp>
-        <p:nvSpPr>
-          <p:cNvPr id="126" name="Rounded Rectangle 125"/>
-          <p:cNvSpPr/>
-          <p:nvPr/>
-        </p:nvSpPr>
-        <p:spPr>
-          <a:xfrm>
-            <a:off x="13073271" y="1751221"/>
-            <a:ext cx="2420471" cy="806824"/>
-          </a:xfrm>
-          <a:prstGeom prst="roundRect">
-            <a:avLst/>
-          </a:prstGeom>
-          <a:noFill/>
-          <a:ln w="31750">
-            <a:solidFill>
-              <a:schemeClr val="tx1">
-                <a:alpha val="63000"/>
-              </a:schemeClr>
-            </a:solidFill>
-            <a:headEnd w="lg" len="lg"/>
-            <a:tailEnd type="triangle"/>
-          </a:ln>
-        </p:spPr>
-        <p:style>
-          <a:lnRef idx="1">
-            <a:schemeClr val="accent1"/>
-          </a:lnRef>
-          <a:fillRef idx="0">
-            <a:schemeClr val="accent1"/>
-          </a:fillRef>
-          <a:effectRef idx="0">
-            <a:schemeClr val="accent1"/>
-          </a:effectRef>
-          <a:fontRef idx="minor">
-            <a:schemeClr val="tx1"/>
-          </a:fontRef>
-        </p:style>
-        <p:txBody>
-          <a:bodyPr rtlCol="0" anchor="ctr"/>
-          <a:lstStyle/>
-          <a:p>
-            <a:pPr algn="ctr"/>
-            <a:r>
-              <a:rPr lang="en-US" sz="2000" dirty="0"/>
-              <a:t>Parameter</a:t>
-            </a:r>
-          </a:p>
-        </p:txBody>
-      </p:sp>
-      <p:sp>
-        <p:nvSpPr>
-          <p:cNvPr id="127" name="Rounded Rectangle 126"/>
-          <p:cNvSpPr/>
-          <p:nvPr/>
-        </p:nvSpPr>
-        <p:spPr>
-          <a:xfrm>
-            <a:off x="13073270" y="2837957"/>
-            <a:ext cx="2420471" cy="806824"/>
-          </a:xfrm>
-          <a:prstGeom prst="roundRect">
-            <a:avLst/>
-          </a:prstGeom>
-          <a:noFill/>
-          <a:ln w="31750">
-            <a:solidFill>
-              <a:schemeClr val="tx1">
-                <a:alpha val="63000"/>
-              </a:schemeClr>
-            </a:solidFill>
-            <a:headEnd w="lg" len="lg"/>
-            <a:tailEnd type="triangle"/>
-          </a:ln>
-        </p:spPr>
-        <p:style>
-          <a:lnRef idx="1">
-            <a:schemeClr val="accent1"/>
-          </a:lnRef>
-          <a:fillRef idx="0">
-            <a:schemeClr val="accent1"/>
-          </a:fillRef>
-          <a:effectRef idx="0">
-            <a:schemeClr val="accent1"/>
-          </a:effectRef>
-          <a:fontRef idx="minor">
-            <a:schemeClr val="tx1"/>
-          </a:fontRef>
-        </p:style>
-        <p:txBody>
-          <a:bodyPr rtlCol="0" anchor="ctr"/>
-          <a:lstStyle/>
-          <a:p>
-            <a:pPr algn="ctr"/>
-            <a:r>
-              <a:rPr lang="en-US" sz="2000" dirty="0"/>
-              <a:t>Block</a:t>
-            </a:r>
-          </a:p>
-        </p:txBody>
-      </p:sp>
-      <p:sp>
-        <p:nvSpPr>
-          <p:cNvPr id="128" name="Rounded Rectangle 127"/>
-          <p:cNvSpPr/>
-          <p:nvPr/>
-        </p:nvSpPr>
-        <p:spPr>
-          <a:xfrm>
-            <a:off x="15143020" y="4027384"/>
-            <a:ext cx="2420471" cy="806824"/>
-          </a:xfrm>
-          <a:prstGeom prst="roundRect">
-            <a:avLst/>
-          </a:prstGeom>
-          <a:noFill/>
-          <a:ln w="31750">
-            <a:solidFill>
-              <a:schemeClr val="tx1">
-                <a:alpha val="63000"/>
-              </a:schemeClr>
-            </a:solidFill>
-            <a:headEnd w="lg" len="lg"/>
-            <a:tailEnd type="triangle"/>
-          </a:ln>
-        </p:spPr>
-        <p:style>
-          <a:lnRef idx="1">
-            <a:schemeClr val="accent1"/>
-          </a:lnRef>
-          <a:fillRef idx="0">
-            <a:schemeClr val="accent1"/>
-          </a:fillRef>
-          <a:effectRef idx="0">
-            <a:schemeClr val="accent1"/>
-          </a:effectRef>
-          <a:fontRef idx="minor">
-            <a:schemeClr val="tx1"/>
-          </a:fontRef>
-        </p:style>
-        <p:txBody>
-          <a:bodyPr rtlCol="0" anchor="ctr"/>
-          <a:lstStyle/>
-          <a:p>
-            <a:pPr algn="ctr"/>
-            <a:endParaRPr lang="en-US" sz="2000" dirty="0"/>
-          </a:p>
-          <a:p>
-            <a:pPr algn="ctr"/>
-            <a:r>
-              <a:rPr lang="en-US" sz="2000" dirty="0"/>
-              <a:t>Variable Declaration</a:t>
-            </a:r>
-          </a:p>
-          <a:p>
-            <a:pPr algn="ctr"/>
-            <a:r>
-              <a:rPr lang="en-US" sz="2000" dirty="0"/>
-              <a:t>Statement </a:t>
-            </a:r>
-          </a:p>
-          <a:p>
-            <a:pPr algn="ctr"/>
-            <a:endParaRPr lang="en-US" sz="2000" dirty="0"/>
-          </a:p>
-        </p:txBody>
-      </p:sp>
-      <p:sp>
-        <p:nvSpPr>
-          <p:cNvPr id="129" name="Rounded Rectangle 128"/>
-          <p:cNvSpPr/>
-          <p:nvPr/>
-        </p:nvSpPr>
-        <p:spPr>
-          <a:xfrm>
-            <a:off x="17245600" y="7324845"/>
-            <a:ext cx="2420471" cy="806824"/>
-          </a:xfrm>
-          <a:prstGeom prst="roundRect">
-            <a:avLst/>
-          </a:prstGeom>
-          <a:noFill/>
-          <a:ln w="31750">
-            <a:solidFill>
-              <a:schemeClr val="tx1">
-                <a:alpha val="63000"/>
-              </a:schemeClr>
-            </a:solidFill>
-            <a:headEnd w="lg" len="lg"/>
-            <a:tailEnd type="triangle"/>
-          </a:ln>
-        </p:spPr>
-        <p:style>
-          <a:lnRef idx="1">
-            <a:schemeClr val="accent1"/>
-          </a:lnRef>
-          <a:fillRef idx="0">
-            <a:schemeClr val="accent1"/>
-          </a:fillRef>
-          <a:effectRef idx="0">
-            <a:schemeClr val="accent1"/>
-          </a:effectRef>
-          <a:fontRef idx="minor">
-            <a:schemeClr val="tx1"/>
-          </a:fontRef>
-        </p:style>
-        <p:txBody>
-          <a:bodyPr rtlCol="0" anchor="ctr"/>
-          <a:lstStyle/>
-          <a:p>
-            <a:pPr algn="ctr"/>
-            <a:r>
-              <a:rPr lang="en-US" sz="2000" dirty="0"/>
-              <a:t>Then Part</a:t>
-            </a:r>
-          </a:p>
-          <a:p>
-            <a:pPr algn="ctr"/>
-            <a:r>
-              <a:rPr lang="en-US" sz="2000" dirty="0">
-                <a:solidFill>
-                  <a:srgbClr val="C00000"/>
-                </a:solidFill>
-              </a:rPr>
-              <a:t>Log Statement</a:t>
-            </a:r>
-          </a:p>
-        </p:txBody>
-      </p:sp>
-      <p:sp>
-        <p:nvSpPr>
-          <p:cNvPr id="130" name="Rounded Rectangle 129"/>
-          <p:cNvSpPr/>
-          <p:nvPr/>
-        </p:nvSpPr>
-        <p:spPr>
-          <a:xfrm>
-            <a:off x="15143020" y="5124174"/>
-            <a:ext cx="2420471" cy="806824"/>
-          </a:xfrm>
-          <a:prstGeom prst="roundRect">
-            <a:avLst/>
-          </a:prstGeom>
-          <a:noFill/>
-          <a:ln w="31750">
-            <a:solidFill>
-              <a:schemeClr val="tx1">
-                <a:alpha val="63000"/>
-              </a:schemeClr>
-            </a:solidFill>
-            <a:headEnd w="lg" len="lg"/>
-            <a:tailEnd type="triangle"/>
-          </a:ln>
-        </p:spPr>
-        <p:style>
-          <a:lnRef idx="1">
-            <a:schemeClr val="accent1"/>
-          </a:lnRef>
-          <a:fillRef idx="0">
-            <a:schemeClr val="accent1"/>
-          </a:fillRef>
-          <a:effectRef idx="0">
-            <a:schemeClr val="accent1"/>
-          </a:effectRef>
-          <a:fontRef idx="minor">
-            <a:schemeClr val="tx1"/>
-          </a:fontRef>
-        </p:style>
-        <p:txBody>
-          <a:bodyPr rtlCol="0" anchor="ctr"/>
-          <a:lstStyle/>
-          <a:p>
-            <a:pPr algn="ctr"/>
-            <a:r>
-              <a:rPr lang="en-US" sz="2000" dirty="0"/>
-              <a:t>If Statement</a:t>
-            </a:r>
-          </a:p>
-        </p:txBody>
-      </p:sp>
       <p:cxnSp>
         <p:nvCxnSpPr>
-          <p:cNvPr id="131" name="Elbow Connector 130"/>
+          <p:cNvPr id="132" name="Elbow Connector 131"/>
           <p:cNvCxnSpPr>
-            <a:stCxn id="125" idx="2"/>
-            <a:endCxn id="126" idx="1"/>
+            <a:endCxn id="127" idx="1"/>
           </p:cNvCxnSpPr>
           <p:nvPr/>
         </p:nvCxnSpPr>
         <p:spPr>
           <a:xfrm rot="16200000" flipH="1">
-            <a:off x="12284255" y="1365617"/>
-            <a:ext cx="751286" cy="826746"/>
+            <a:off x="13549349" y="2264192"/>
+            <a:ext cx="1259480" cy="851569"/>
           </a:xfrm>
           <a:prstGeom prst="bentConnector2">
             <a:avLst/>
@@ -4342,16 +4353,17 @@
       </p:cxnSp>
       <p:cxnSp>
         <p:nvCxnSpPr>
-          <p:cNvPr id="132" name="Elbow Connector 131"/>
+          <p:cNvPr id="133" name="Elbow Connector 132"/>
           <p:cNvCxnSpPr>
-            <a:endCxn id="127" idx="1"/>
+            <a:stCxn id="127" idx="2"/>
+            <a:endCxn id="128" idx="1"/>
           </p:cNvCxnSpPr>
           <p:nvPr/>
         </p:nvCxnSpPr>
         <p:spPr>
           <a:xfrm rot="16200000" flipH="1">
-            <a:off x="12116532" y="2284629"/>
-            <a:ext cx="1086735" cy="826746"/>
+            <a:off x="16070463" y="3957246"/>
+            <a:ext cx="958957" cy="689734"/>
           </a:xfrm>
           <a:prstGeom prst="bentConnector2">
             <a:avLst/>
@@ -4389,17 +4401,16 @@
       </p:cxnSp>
       <p:cxnSp>
         <p:nvCxnSpPr>
-          <p:cNvPr id="133" name="Elbow Connector 132"/>
+          <p:cNvPr id="134" name="Elbow Connector 133"/>
           <p:cNvCxnSpPr>
-            <a:stCxn id="127" idx="2"/>
-            <a:endCxn id="128" idx="1"/>
+            <a:endCxn id="129" idx="1"/>
           </p:cNvCxnSpPr>
           <p:nvPr/>
         </p:nvCxnSpPr>
         <p:spPr>
           <a:xfrm rot="16200000" flipH="1">
-            <a:off x="14320256" y="3608031"/>
-            <a:ext cx="786015" cy="859514"/>
+            <a:off x="18244292" y="7605456"/>
+            <a:ext cx="1292999" cy="805292"/>
           </a:xfrm>
           <a:prstGeom prst="bentConnector2">
             <a:avLst/>
@@ -4437,16 +4448,16 @@
       </p:cxnSp>
       <p:cxnSp>
         <p:nvCxnSpPr>
-          <p:cNvPr id="134" name="Elbow Connector 133"/>
+          <p:cNvPr id="139" name="Elbow Connector 138"/>
           <p:cNvCxnSpPr>
-            <a:endCxn id="129" idx="1"/>
+            <a:endCxn id="130" idx="1"/>
           </p:cNvCxnSpPr>
           <p:nvPr/>
         </p:nvCxnSpPr>
         <p:spPr>
           <a:xfrm rot="16200000" flipH="1">
-            <a:off x="16251072" y="6733728"/>
-            <a:ext cx="1096713" cy="892343"/>
+            <a:off x="15900008" y="5086658"/>
+            <a:ext cx="1293002" cy="682871"/>
           </a:xfrm>
           <a:prstGeom prst="bentConnector2">
             <a:avLst/>
@@ -4484,16 +4495,16 @@
       </p:cxnSp>
       <p:cxnSp>
         <p:nvCxnSpPr>
-          <p:cNvPr id="139" name="Elbow Connector 138"/>
+          <p:cNvPr id="63" name="Elbow Connector 62"/>
           <p:cNvCxnSpPr>
-            <a:endCxn id="130" idx="1"/>
+            <a:endCxn id="68" idx="1"/>
           </p:cNvCxnSpPr>
           <p:nvPr/>
         </p:nvCxnSpPr>
         <p:spPr>
           <a:xfrm rot="16200000" flipH="1">
-            <a:off x="14164869" y="4549435"/>
-            <a:ext cx="1096788" cy="859513"/>
+            <a:off x="6304671" y="6228365"/>
+            <a:ext cx="1296294" cy="804579"/>
           </a:xfrm>
           <a:prstGeom prst="bentConnector2">
             <a:avLst/>
@@ -4585,7 +4596,7 @@
     </a:clrScheme>
     <a:fontScheme name="Office Theme">
       <a:majorFont>
-        <a:latin typeface="Calibri Light" panose="020F0302020204030204"/>
+        <a:latin typeface="Calibri Light"/>
         <a:ea typeface=""/>
         <a:cs typeface=""/>
         <a:font script="Jpan" typeface="ＭＳ Ｐゴシック"/>
@@ -4620,7 +4631,7 @@
         <a:font script="Geor" typeface="Sylfaen"/>
       </a:majorFont>
       <a:minorFont>
-        <a:latin typeface="Calibri" panose="020F0502020204030204"/>
+        <a:latin typeface="Calibri"/>
         <a:ea typeface=""/>
         <a:cs typeface=""/>
         <a:font script="Jpan" typeface="ＭＳ Ｐゴシック"/>
@@ -4797,7 +4808,7 @@
   <a:extraClrSchemeLst/>
   <a:extLst>
     <a:ext uri="{05A4C25C-085E-4340-85A3-A5531E510DB2}">
-      <thm15:themeFamily xmlns:thm15="http://schemas.microsoft.com/office/thememl/2012/main" name="Office Theme" id="{62F939B6-93AF-4DB8-9C6B-D6C7DFDC589F}" vid="{4A3C46E8-61CC-4603-A589-7422A47A8E4A}"/>
+      <thm15:themeFamily xmlns="" xmlns:thm15="http://schemas.microsoft.com/office/thememl/2012/main" name="Office Theme" id="{62F939B6-93AF-4DB8-9C6B-D6C7DFDC589F}" vid="{4A3C46E8-61CC-4603-A589-7422A47A8E4A}"/>
     </a:ext>
   </a:extLst>
 </a:theme>

</xml_diff>